<commit_message>
Added module description to the presentation.
</commit_message>
<xml_diff>
--- a/docs/final_documentation/Musterpräsentation.pptx
+++ b/docs/final_documentation/Musterpräsentation.pptx
@@ -5,10 +5,10 @@
     <p:sldMasterId id="2147483649" r:id="rId1"/>
   </p:sldMasterIdLst>
   <p:notesMasterIdLst>
-    <p:notesMasterId r:id="rId18"/>
+    <p:notesMasterId r:id="rId20"/>
   </p:notesMasterIdLst>
   <p:handoutMasterIdLst>
-    <p:handoutMasterId r:id="rId19"/>
+    <p:handoutMasterId r:id="rId21"/>
   </p:handoutMasterIdLst>
   <p:sldIdLst>
     <p:sldId id="350" r:id="rId2"/>
@@ -17,16 +17,18 @@
     <p:sldId id="338" r:id="rId5"/>
     <p:sldId id="347" r:id="rId6"/>
     <p:sldId id="348" r:id="rId7"/>
-    <p:sldId id="349" r:id="rId8"/>
-    <p:sldId id="337" r:id="rId9"/>
-    <p:sldId id="334" r:id="rId10"/>
-    <p:sldId id="336" r:id="rId11"/>
-    <p:sldId id="339" r:id="rId12"/>
-    <p:sldId id="341" r:id="rId13"/>
-    <p:sldId id="342" r:id="rId14"/>
-    <p:sldId id="343" r:id="rId15"/>
-    <p:sldId id="344" r:id="rId16"/>
-    <p:sldId id="345" r:id="rId17"/>
+    <p:sldId id="351" r:id="rId8"/>
+    <p:sldId id="352" r:id="rId9"/>
+    <p:sldId id="349" r:id="rId10"/>
+    <p:sldId id="337" r:id="rId11"/>
+    <p:sldId id="334" r:id="rId12"/>
+    <p:sldId id="336" r:id="rId13"/>
+    <p:sldId id="339" r:id="rId14"/>
+    <p:sldId id="341" r:id="rId15"/>
+    <p:sldId id="342" r:id="rId16"/>
+    <p:sldId id="343" r:id="rId17"/>
+    <p:sldId id="344" r:id="rId18"/>
+    <p:sldId id="345" r:id="rId19"/>
   </p:sldIdLst>
   <p:sldSz cx="9144000" cy="6858000" type="screen4x3"/>
   <p:notesSz cx="6858000" cy="9144000"/>
@@ -2540,6 +2542,409 @@
 </p:notesMaster>
 </file>
 
+<file path=ppt/notesSlides/notesSlide1.xml><?xml version="1.0" encoding="utf-8"?>
+<p:notes xmlns:a="http://schemas.openxmlformats.org/drawingml/2006/main" xmlns:r="http://schemas.openxmlformats.org/officeDocument/2006/relationships" xmlns:p="http://schemas.openxmlformats.org/presentationml/2006/main">
+  <p:cSld>
+    <p:spTree>
+      <p:nvGrpSpPr>
+        <p:cNvPr id="1" name=""/>
+        <p:cNvGrpSpPr/>
+        <p:nvPr/>
+      </p:nvGrpSpPr>
+      <p:grpSpPr>
+        <a:xfrm>
+          <a:off x="0" y="0"/>
+          <a:ext cx="0" cy="0"/>
+          <a:chOff x="0" y="0"/>
+          <a:chExt cx="0" cy="0"/>
+        </a:xfrm>
+      </p:grpSpPr>
+      <p:sp>
+        <p:nvSpPr>
+          <p:cNvPr id="2" name="Folienbildplatzhalter 1"/>
+          <p:cNvSpPr>
+            <a:spLocks noGrp="1" noRot="1" noChangeAspect="1"/>
+          </p:cNvSpPr>
+          <p:nvPr>
+            <p:ph type="sldImg"/>
+          </p:nvPr>
+        </p:nvSpPr>
+        <p:spPr/>
+      </p:sp>
+      <p:sp>
+        <p:nvSpPr>
+          <p:cNvPr id="3" name="Notizenplatzhalter 2"/>
+          <p:cNvSpPr>
+            <a:spLocks noGrp="1"/>
+          </p:cNvSpPr>
+          <p:nvPr>
+            <p:ph type="body" idx="1"/>
+          </p:nvPr>
+        </p:nvSpPr>
+        <p:spPr/>
+        <p:txBody>
+          <a:bodyPr/>
+          <a:lstStyle/>
+          <a:p>
+            <a:r>
+              <a:rPr lang="en-US" dirty="0" err="1"/>
+              <a:t>Generate_input</a:t>
+            </a:r>
+            <a:r>
+              <a:rPr lang="en-US" dirty="0"/>
+              <a:t>:</a:t>
+            </a:r>
+          </a:p>
+          <a:p>
+            <a:pPr marL="171450" indent="-171450">
+              <a:buFont typeface="Arial" panose="020B0604020202020204" pitchFamily="34" charset="0"/>
+              <a:buChar char="•"/>
+            </a:pPr>
+            <a:r>
+              <a:rPr lang="en-US" dirty="0"/>
+              <a:t>Check </a:t>
+            </a:r>
+            <a:r>
+              <a:rPr lang="en-US" dirty="0" err="1"/>
+              <a:t>ecg_length</a:t>
+            </a:r>
+            <a:endParaRPr lang="en-US" dirty="0"/>
+          </a:p>
+          <a:p>
+            <a:pPr marL="171450" indent="-171450">
+              <a:buFont typeface="Arial" panose="020B0604020202020204" pitchFamily="34" charset="0"/>
+              <a:buChar char="•"/>
+            </a:pPr>
+            <a:r>
+              <a:rPr lang="en-US" dirty="0"/>
+              <a:t>Hamming window (</a:t>
+            </a:r>
+            <a:r>
+              <a:rPr lang="en-US" dirty="0" err="1"/>
+              <a:t>ecg_chunk</a:t>
+            </a:r>
+            <a:r>
+              <a:rPr lang="en-US" dirty="0"/>
+              <a:t>)</a:t>
+            </a:r>
+          </a:p>
+          <a:p>
+            <a:pPr marL="171450" indent="-171450">
+              <a:buFont typeface="Arial" panose="020B0604020202020204" pitchFamily="34" charset="0"/>
+              <a:buChar char="•"/>
+            </a:pPr>
+            <a:r>
+              <a:rPr lang="en-US" dirty="0"/>
+              <a:t>Fill histogram </a:t>
+            </a:r>
+            <a:r>
+              <a:rPr lang="en-US" dirty="0" err="1"/>
+              <a:t>ringbuffer</a:t>
+            </a:r>
+            <a:endParaRPr lang="en-US" dirty="0"/>
+          </a:p>
+          <a:p>
+            <a:pPr marL="628650" lvl="1" indent="-171450">
+              <a:buFont typeface="Arial" panose="020B0604020202020204" pitchFamily="34" charset="0"/>
+              <a:buChar char="•"/>
+            </a:pPr>
+            <a:r>
+              <a:rPr lang="en-US" dirty="0"/>
+              <a:t>Until then : return []</a:t>
+            </a:r>
+          </a:p>
+          <a:p>
+            <a:pPr marL="171450" lvl="0" indent="-171450">
+              <a:buFont typeface="Arial" panose="020B0604020202020204" pitchFamily="34" charset="0"/>
+              <a:buChar char="•"/>
+            </a:pPr>
+            <a:r>
+              <a:rPr lang="en-US" dirty="0"/>
+              <a:t>Return [ max </a:t>
+            </a:r>
+            <a:r>
+              <a:rPr lang="en-US" dirty="0" err="1"/>
+              <a:t>idx</a:t>
+            </a:r>
+            <a:r>
+              <a:rPr lang="en-US" dirty="0"/>
+              <a:t> ] </a:t>
+            </a:r>
+          </a:p>
+          <a:p>
+            <a:pPr marL="0" lvl="0" indent="0">
+              <a:buFont typeface="Arial" panose="020B0604020202020204" pitchFamily="34" charset="0"/>
+              <a:buNone/>
+            </a:pPr>
+            <a:r>
+              <a:rPr lang="en-US" dirty="0"/>
+              <a:t>                ( 1 x 26 )</a:t>
+            </a:r>
+          </a:p>
+          <a:p>
+            <a:pPr marL="0" lvl="0" indent="0">
+              <a:buFont typeface="Arial" panose="020B0604020202020204" pitchFamily="34" charset="0"/>
+              <a:buNone/>
+            </a:pPr>
+            <a:endParaRPr lang="en-US" dirty="0"/>
+          </a:p>
+          <a:p>
+            <a:pPr marL="0" lvl="0" indent="0">
+              <a:buFont typeface="Arial" panose="020B0604020202020204" pitchFamily="34" charset="0"/>
+              <a:buNone/>
+            </a:pPr>
+            <a:r>
+              <a:rPr lang="en-US" dirty="0" err="1"/>
+              <a:t>Process_histogram</a:t>
+            </a:r>
+            <a:r>
+              <a:rPr lang="en-US" dirty="0"/>
+              <a:t>:</a:t>
+            </a:r>
+          </a:p>
+          <a:p>
+            <a:pPr marL="171450" lvl="0" indent="-171450">
+              <a:buFont typeface="Arial" panose="020B0604020202020204" pitchFamily="34" charset="0"/>
+              <a:buChar char="•"/>
+            </a:pPr>
+            <a:r>
+              <a:rPr lang="en-US" dirty="0"/>
+              <a:t>Cut window ( 104 x 121 )</a:t>
+            </a:r>
+          </a:p>
+          <a:p>
+            <a:pPr marL="171450" lvl="0" indent="-171450">
+              <a:buFont typeface="Arial" panose="020B0604020202020204" pitchFamily="34" charset="0"/>
+              <a:buChar char="•"/>
+            </a:pPr>
+            <a:r>
+              <a:rPr lang="en-US" dirty="0"/>
+              <a:t>Get max </a:t>
+            </a:r>
+            <a:r>
+              <a:rPr lang="en-US" dirty="0" err="1"/>
+              <a:t>val</a:t>
+            </a:r>
+            <a:r>
+              <a:rPr lang="en-US" dirty="0"/>
+              <a:t>, max </a:t>
+            </a:r>
+            <a:r>
+              <a:rPr lang="en-US" dirty="0" err="1"/>
+              <a:t>idx</a:t>
+            </a:r>
+            <a:endParaRPr lang="en-US" dirty="0"/>
+          </a:p>
+          <a:p>
+            <a:pPr marL="0" lvl="0" indent="0">
+              <a:buFont typeface="Arial" panose="020B0604020202020204" pitchFamily="34" charset="0"/>
+              <a:buNone/>
+            </a:pPr>
+            <a:endParaRPr lang="en-US" dirty="0"/>
+          </a:p>
+          <a:p>
+            <a:pPr marL="0" lvl="0" indent="0">
+              <a:buFont typeface="Arial" panose="020B0604020202020204" pitchFamily="34" charset="0"/>
+              <a:buNone/>
+            </a:pPr>
+            <a:r>
+              <a:rPr lang="en-US" dirty="0" err="1"/>
+              <a:t>Process_values</a:t>
+            </a:r>
+            <a:r>
+              <a:rPr lang="en-US" dirty="0"/>
+              <a:t>:</a:t>
+            </a:r>
+          </a:p>
+          <a:p>
+            <a:pPr marL="171450" lvl="0" indent="-171450">
+              <a:buFont typeface="Arial" panose="020B0604020202020204" pitchFamily="34" charset="0"/>
+              <a:buChar char="•"/>
+            </a:pPr>
+            <a:r>
+              <a:rPr lang="en-US" dirty="0"/>
+              <a:t>Lowpass </a:t>
+            </a:r>
+            <a:r>
+              <a:rPr lang="en-US" dirty="0" err="1"/>
+              <a:t>idx</a:t>
+            </a:r>
+            <a:endParaRPr lang="en-US" dirty="0"/>
+          </a:p>
+          <a:p>
+            <a:pPr marL="171450" lvl="0" indent="-171450">
+              <a:buFont typeface="Arial" panose="020B0604020202020204" pitchFamily="34" charset="0"/>
+              <a:buChar char="•"/>
+            </a:pPr>
+            <a:r>
+              <a:rPr lang="en-US" dirty="0"/>
+              <a:t>New max ( </a:t>
+            </a:r>
+            <a:r>
+              <a:rPr lang="en-US" dirty="0" err="1"/>
+              <a:t>idx</a:t>
+            </a:r>
+            <a:r>
+              <a:rPr lang="en-US" dirty="0"/>
+              <a:t> )</a:t>
+            </a:r>
+          </a:p>
+          <a:p>
+            <a:pPr marL="171450" lvl="0" indent="-171450">
+              <a:buFont typeface="Arial" panose="020B0604020202020204" pitchFamily="34" charset="0"/>
+              <a:buChar char="•"/>
+            </a:pPr>
+            <a:endParaRPr lang="en-US" dirty="0"/>
+          </a:p>
+          <a:p>
+            <a:pPr marL="0" lvl="0" indent="0">
+              <a:buFont typeface="Arial" panose="020B0604020202020204" pitchFamily="34" charset="0"/>
+              <a:buNone/>
+            </a:pPr>
+            <a:endParaRPr lang="en-US" dirty="0"/>
+          </a:p>
+          <a:p>
+            <a:pPr marL="171450" lvl="0" indent="-171450">
+              <a:buFont typeface="Arial" panose="020B0604020202020204" pitchFamily="34" charset="0"/>
+              <a:buChar char="•"/>
+            </a:pPr>
+            <a:endParaRPr lang="en-US" dirty="0"/>
+          </a:p>
+          <a:p>
+            <a:pPr marL="171450" lvl="0" indent="-171450">
+              <a:buFont typeface="Arial" panose="020B0604020202020204" pitchFamily="34" charset="0"/>
+              <a:buChar char="•"/>
+            </a:pPr>
+            <a:endParaRPr lang="de-DE" dirty="0"/>
+          </a:p>
+        </p:txBody>
+      </p:sp>
+      <p:sp>
+        <p:nvSpPr>
+          <p:cNvPr id="4" name="Foliennummernplatzhalter 3"/>
+          <p:cNvSpPr>
+            <a:spLocks noGrp="1"/>
+          </p:cNvSpPr>
+          <p:nvPr>
+            <p:ph type="sldNum" sz="quarter" idx="10"/>
+          </p:nvPr>
+        </p:nvSpPr>
+        <p:spPr/>
+        <p:txBody>
+          <a:bodyPr/>
+          <a:lstStyle/>
+          <a:p>
+            <a:fld id="{1760A340-2167-4270-89CF-50EB6C0DB420}" type="slidenum">
+              <a:rPr lang="de-DE" altLang="de-DE" smtClean="0"/>
+              <a:pPr/>
+              <a:t>7</a:t>
+            </a:fld>
+            <a:endParaRPr lang="de-DE" altLang="de-DE"/>
+          </a:p>
+        </p:txBody>
+      </p:sp>
+    </p:spTree>
+    <p:extLst>
+      <p:ext uri="{BB962C8B-B14F-4D97-AF65-F5344CB8AC3E}">
+        <p14:creationId xmlns:p14="http://schemas.microsoft.com/office/powerpoint/2010/main" val="3112521109"/>
+      </p:ext>
+    </p:extLst>
+  </p:cSld>
+  <p:clrMapOvr>
+    <a:masterClrMapping/>
+  </p:clrMapOvr>
+</p:notes>
+</file>
+
+<file path=ppt/notesSlides/notesSlide2.xml><?xml version="1.0" encoding="utf-8"?>
+<p:notes xmlns:a="http://schemas.openxmlformats.org/drawingml/2006/main" xmlns:r="http://schemas.openxmlformats.org/officeDocument/2006/relationships" xmlns:p="http://schemas.openxmlformats.org/presentationml/2006/main">
+  <p:cSld>
+    <p:spTree>
+      <p:nvGrpSpPr>
+        <p:cNvPr id="1" name=""/>
+        <p:cNvGrpSpPr/>
+        <p:nvPr/>
+      </p:nvGrpSpPr>
+      <p:grpSpPr>
+        <a:xfrm>
+          <a:off x="0" y="0"/>
+          <a:ext cx="0" cy="0"/>
+          <a:chOff x="0" y="0"/>
+          <a:chExt cx="0" cy="0"/>
+        </a:xfrm>
+      </p:grpSpPr>
+      <p:sp>
+        <p:nvSpPr>
+          <p:cNvPr id="2" name="Folienbildplatzhalter 1"/>
+          <p:cNvSpPr>
+            <a:spLocks noGrp="1" noRot="1" noChangeAspect="1"/>
+          </p:cNvSpPr>
+          <p:nvPr>
+            <p:ph type="sldImg"/>
+          </p:nvPr>
+        </p:nvSpPr>
+        <p:spPr/>
+      </p:sp>
+      <p:sp>
+        <p:nvSpPr>
+          <p:cNvPr id="3" name="Notizenplatzhalter 2"/>
+          <p:cNvSpPr>
+            <a:spLocks noGrp="1"/>
+          </p:cNvSpPr>
+          <p:nvPr>
+            <p:ph type="body" idx="1"/>
+          </p:nvPr>
+        </p:nvSpPr>
+        <p:spPr/>
+        <p:txBody>
+          <a:bodyPr/>
+          <a:lstStyle/>
+          <a:p>
+            <a:pPr marL="171450" lvl="0" indent="-171450">
+              <a:buFont typeface="Arial" panose="020B0604020202020204" pitchFamily="34" charset="0"/>
+              <a:buChar char="•"/>
+            </a:pPr>
+            <a:endParaRPr lang="de-DE" dirty="0"/>
+          </a:p>
+        </p:txBody>
+      </p:sp>
+      <p:sp>
+        <p:nvSpPr>
+          <p:cNvPr id="4" name="Foliennummernplatzhalter 3"/>
+          <p:cNvSpPr>
+            <a:spLocks noGrp="1"/>
+          </p:cNvSpPr>
+          <p:nvPr>
+            <p:ph type="sldNum" sz="quarter" idx="10"/>
+          </p:nvPr>
+        </p:nvSpPr>
+        <p:spPr/>
+        <p:txBody>
+          <a:bodyPr/>
+          <a:lstStyle/>
+          <a:p>
+            <a:fld id="{1760A340-2167-4270-89CF-50EB6C0DB420}" type="slidenum">
+              <a:rPr lang="de-DE" altLang="de-DE" smtClean="0"/>
+              <a:pPr/>
+              <a:t>8</a:t>
+            </a:fld>
+            <a:endParaRPr lang="de-DE" altLang="de-DE"/>
+          </a:p>
+        </p:txBody>
+      </p:sp>
+    </p:spTree>
+    <p:extLst>
+      <p:ext uri="{BB962C8B-B14F-4D97-AF65-F5344CB8AC3E}">
+        <p14:creationId xmlns:p14="http://schemas.microsoft.com/office/powerpoint/2010/main" val="417091890"/>
+      </p:ext>
+    </p:extLst>
+  </p:cSld>
+  <p:clrMapOvr>
+    <a:masterClrMapping/>
+  </p:clrMapOvr>
+</p:notes>
+</file>
+
 <file path=ppt/slideLayouts/slideLayout1.xml><?xml version="1.0" encoding="utf-8"?>
 <p:sldLayout xmlns:a="http://schemas.openxmlformats.org/drawingml/2006/main" xmlns:r="http://schemas.openxmlformats.org/officeDocument/2006/relationships" xmlns:p="http://schemas.openxmlformats.org/presentationml/2006/main" showMasterSp="0" type="title" preserve="1">
   <p:cSld name="Titelfolie">
@@ -4130,445 +4535,53 @@
           <a:bodyPr/>
           <a:lstStyle/>
           <a:p>
-            <a:r>
+            <a:br>
               <a:rPr lang="de-DE" altLang="de-DE" dirty="0"/>
-              <a:t>Überschrift Bildfolie – Text-Bild-Kombination</a:t>
-            </a:r>
+            </a:br>
+            <a:endParaRPr lang="de-DE" altLang="de-DE" dirty="0"/>
           </a:p>
         </p:txBody>
       </p:sp>
-      <p:sp>
-        <p:nvSpPr>
-          <p:cNvPr id="6" name="Rectangle 3"/>
-          <p:cNvSpPr txBox="1">
-            <a:spLocks noChangeArrowheads="1"/>
-          </p:cNvSpPr>
+      <p:pic>
+        <p:nvPicPr>
+          <p:cNvPr id="7" name="Grafik 6">
+            <a:extLst>
+              <a:ext uri="{FF2B5EF4-FFF2-40B4-BE49-F238E27FC236}">
+                <a16:creationId xmlns:a16="http://schemas.microsoft.com/office/drawing/2014/main" id="{8483136C-9CE8-4C03-9D7D-41B57C8F8891}"/>
+              </a:ext>
+            </a:extLst>
+          </p:cNvPr>
+          <p:cNvPicPr>
+            <a:picLocks noChangeAspect="1"/>
+          </p:cNvPicPr>
           <p:nvPr/>
-        </p:nvSpPr>
+        </p:nvPicPr>
+        <p:blipFill>
+          <a:blip r:embed="rId2">
+            <a:extLst>
+              <a:ext uri="{28A0092B-C50C-407E-A947-70E740481C1C}">
+                <a14:useLocalDpi xmlns:a14="http://schemas.microsoft.com/office/drawing/2010/main" val="0"/>
+              </a:ext>
+            </a:extLst>
+          </a:blip>
+          <a:stretch>
+            <a:fillRect/>
+          </a:stretch>
+        </p:blipFill>
         <p:spPr>
           <a:xfrm>
-            <a:off x="4932363" y="2160000"/>
-            <a:ext cx="3743325" cy="3600450"/>
+            <a:off x="665820" y="1196752"/>
+            <a:ext cx="7812360" cy="5122859"/>
           </a:xfrm>
           <a:prstGeom prst="rect">
             <a:avLst/>
           </a:prstGeom>
         </p:spPr>
-        <p:txBody>
-          <a:bodyPr/>
-          <a:lstStyle>
-            <a:lvl1pPr algn="l" rtl="0" eaLnBrk="1" fontAlgn="base" hangingPunct="1">
-              <a:lnSpc>
-                <a:spcPct val="110000"/>
-              </a:lnSpc>
-              <a:spcBef>
-                <a:spcPct val="0"/>
-              </a:spcBef>
-              <a:spcAft>
-                <a:spcPct val="20000"/>
-              </a:spcAft>
-              <a:defRPr>
-                <a:solidFill>
-                  <a:schemeClr val="tx1"/>
-                </a:solidFill>
-                <a:latin typeface="+mn-lt"/>
-                <a:ea typeface="+mn-ea"/>
-                <a:cs typeface="+mn-cs"/>
-              </a:defRPr>
-            </a:lvl1pPr>
-            <a:lvl2pPr marL="182563" indent="-180975" algn="l" rtl="0" eaLnBrk="1" fontAlgn="base" hangingPunct="1">
-              <a:lnSpc>
-                <a:spcPct val="110000"/>
-              </a:lnSpc>
-              <a:spcBef>
-                <a:spcPct val="0"/>
-              </a:spcBef>
-              <a:spcAft>
-                <a:spcPct val="20000"/>
-              </a:spcAft>
-              <a:buFont typeface="Arial" charset="0"/>
-              <a:buChar char="•"/>
-              <a:defRPr>
-                <a:solidFill>
-                  <a:schemeClr val="tx1"/>
-                </a:solidFill>
-                <a:latin typeface="+mn-lt"/>
-              </a:defRPr>
-            </a:lvl2pPr>
-            <a:lvl3pPr marL="366713" indent="-182563" algn="l" rtl="0" eaLnBrk="1" fontAlgn="base" hangingPunct="1">
-              <a:lnSpc>
-                <a:spcPct val="110000"/>
-              </a:lnSpc>
-              <a:spcBef>
-                <a:spcPct val="0"/>
-              </a:spcBef>
-              <a:spcAft>
-                <a:spcPct val="20000"/>
-              </a:spcAft>
-              <a:buFont typeface="Arial" charset="0"/>
-              <a:buChar char="•"/>
-              <a:defRPr>
-                <a:solidFill>
-                  <a:schemeClr val="tx1"/>
-                </a:solidFill>
-                <a:latin typeface="+mn-lt"/>
-              </a:defRPr>
-            </a:lvl3pPr>
-            <a:lvl4pPr marL="552450" indent="-184150" algn="l" rtl="0" eaLnBrk="1" fontAlgn="base" hangingPunct="1">
-              <a:lnSpc>
-                <a:spcPct val="110000"/>
-              </a:lnSpc>
-              <a:spcBef>
-                <a:spcPct val="0"/>
-              </a:spcBef>
-              <a:spcAft>
-                <a:spcPct val="20000"/>
-              </a:spcAft>
-              <a:buFont typeface="Arial" charset="0"/>
-              <a:buChar char="•"/>
-              <a:defRPr>
-                <a:solidFill>
-                  <a:schemeClr val="tx1"/>
-                </a:solidFill>
-                <a:latin typeface="+mn-lt"/>
-              </a:defRPr>
-            </a:lvl4pPr>
-            <a:lvl5pPr marL="738188" indent="-184150" algn="l" rtl="0" eaLnBrk="1" fontAlgn="base" hangingPunct="1">
-              <a:lnSpc>
-                <a:spcPct val="110000"/>
-              </a:lnSpc>
-              <a:spcBef>
-                <a:spcPct val="0"/>
-              </a:spcBef>
-              <a:spcAft>
-                <a:spcPct val="20000"/>
-              </a:spcAft>
-              <a:buFont typeface="Arial" charset="0"/>
-              <a:buChar char="•"/>
-              <a:defRPr>
-                <a:solidFill>
-                  <a:schemeClr val="tx1"/>
-                </a:solidFill>
-                <a:latin typeface="+mn-lt"/>
-              </a:defRPr>
-            </a:lvl5pPr>
-            <a:lvl6pPr marL="1195388" indent="-184150" algn="l" rtl="0" eaLnBrk="1" fontAlgn="base" hangingPunct="1">
-              <a:lnSpc>
-                <a:spcPct val="110000"/>
-              </a:lnSpc>
-              <a:spcBef>
-                <a:spcPct val="0"/>
-              </a:spcBef>
-              <a:spcAft>
-                <a:spcPct val="20000"/>
-              </a:spcAft>
-              <a:buFont typeface="Arial" charset="0"/>
-              <a:buChar char="•"/>
-              <a:defRPr>
-                <a:solidFill>
-                  <a:schemeClr val="tx1"/>
-                </a:solidFill>
-                <a:latin typeface="+mn-lt"/>
-              </a:defRPr>
-            </a:lvl6pPr>
-            <a:lvl7pPr marL="1652588" indent="-184150" algn="l" rtl="0" eaLnBrk="1" fontAlgn="base" hangingPunct="1">
-              <a:lnSpc>
-                <a:spcPct val="110000"/>
-              </a:lnSpc>
-              <a:spcBef>
-                <a:spcPct val="0"/>
-              </a:spcBef>
-              <a:spcAft>
-                <a:spcPct val="20000"/>
-              </a:spcAft>
-              <a:buFont typeface="Arial" charset="0"/>
-              <a:buChar char="•"/>
-              <a:defRPr>
-                <a:solidFill>
-                  <a:schemeClr val="tx1"/>
-                </a:solidFill>
-                <a:latin typeface="+mn-lt"/>
-              </a:defRPr>
-            </a:lvl7pPr>
-            <a:lvl8pPr marL="2109788" indent="-184150" algn="l" rtl="0" eaLnBrk="1" fontAlgn="base" hangingPunct="1">
-              <a:lnSpc>
-                <a:spcPct val="110000"/>
-              </a:lnSpc>
-              <a:spcBef>
-                <a:spcPct val="0"/>
-              </a:spcBef>
-              <a:spcAft>
-                <a:spcPct val="20000"/>
-              </a:spcAft>
-              <a:buFont typeface="Arial" charset="0"/>
-              <a:buChar char="•"/>
-              <a:defRPr>
-                <a:solidFill>
-                  <a:schemeClr val="tx1"/>
-                </a:solidFill>
-                <a:latin typeface="+mn-lt"/>
-              </a:defRPr>
-            </a:lvl8pPr>
-            <a:lvl9pPr marL="2566988" indent="-184150" algn="l" rtl="0" eaLnBrk="1" fontAlgn="base" hangingPunct="1">
-              <a:lnSpc>
-                <a:spcPct val="110000"/>
-              </a:lnSpc>
-              <a:spcBef>
-                <a:spcPct val="0"/>
-              </a:spcBef>
-              <a:spcAft>
-                <a:spcPct val="20000"/>
-              </a:spcAft>
-              <a:buFont typeface="Arial" charset="0"/>
-              <a:buChar char="•"/>
-              <a:defRPr>
-                <a:solidFill>
-                  <a:schemeClr val="tx1"/>
-                </a:solidFill>
-                <a:latin typeface="+mn-lt"/>
-              </a:defRPr>
-            </a:lvl9pPr>
-          </a:lstStyle>
-          <a:p>
-            <a:r>
-              <a:rPr lang="de-DE" altLang="de-DE" kern="0"/>
-              <a:t>Es war der erste und entscheidende Schritt in seiner Entwicklung geschehen.</a:t>
-            </a:r>
-          </a:p>
-          <a:p>
-            <a:pPr marL="134938" lvl="1" indent="-133350"/>
-            <a:r>
-              <a:rPr lang="de-DE" altLang="de-DE" kern="0"/>
-              <a:t>Die amtliche Aufnahme in die Elite mit dem innern</a:t>
-            </a:r>
-          </a:p>
-          <a:p>
-            <a:pPr marL="134938" lvl="1" indent="-133350"/>
-            <a:r>
-              <a:rPr lang="de-DE" altLang="de-DE" kern="0"/>
-              <a:t>Erlebnis der Berufung zusammenfällt. </a:t>
-            </a:r>
-          </a:p>
-          <a:p>
-            <a:pPr marL="134938" lvl="1" indent="-133350"/>
-            <a:r>
-              <a:rPr lang="de-DE" altLang="de-DE" kern="0"/>
-              <a:t>Es geht durchaus nicht allen Eliteschülern so</a:t>
-            </a:r>
-          </a:p>
-        </p:txBody>
-      </p:sp>
-      <p:sp>
-        <p:nvSpPr>
-          <p:cNvPr id="7" name="Rectangle 4"/>
-          <p:cNvSpPr>
-            <a:spLocks noChangeArrowheads="1"/>
-          </p:cNvSpPr>
-          <p:nvPr/>
-        </p:nvSpPr>
-        <p:spPr bwMode="invGray">
-          <a:xfrm>
-            <a:off x="971550" y="2160000"/>
-            <a:ext cx="3744913" cy="3600450"/>
-          </a:xfrm>
-          <a:prstGeom prst="rect">
-            <a:avLst/>
-          </a:prstGeom>
-          <a:solidFill>
-            <a:srgbClr val="C0C0C0"/>
-          </a:solidFill>
-          <a:ln>
-            <a:noFill/>
-          </a:ln>
-          <a:effectLst/>
-          <a:extLst>
-            <a:ext uri="{91240B29-F687-4F45-9708-019B960494DF}">
-              <a14:hiddenLine xmlns:a14="http://schemas.microsoft.com/office/drawing/2010/main" w="19050" algn="ctr">
-                <a:solidFill>
-                  <a:schemeClr val="tx2"/>
-                </a:solidFill>
-                <a:miter lim="800000"/>
-                <a:headEnd/>
-                <a:tailEnd/>
-              </a14:hiddenLine>
-            </a:ext>
-            <a:ext uri="{AF507438-7753-43E0-B8FC-AC1667EBCBE1}">
-              <a14:hiddenEffects xmlns:a14="http://schemas.microsoft.com/office/drawing/2010/main">
-                <a:effectLst>
-                  <a:outerShdw dist="35921" dir="2700000" algn="ctr" rotWithShape="0">
-                    <a:schemeClr val="bg2"/>
-                  </a:outerShdw>
-                </a:effectLst>
-              </a14:hiddenEffects>
-            </a:ext>
-          </a:extLst>
-        </p:spPr>
-        <p:txBody>
-          <a:bodyPr lIns="0" tIns="0" rIns="0" bIns="0" anchor="ctr"/>
-          <a:lstStyle>
-            <a:lvl1pPr marL="376238" algn="l">
-              <a:defRPr sz="2400">
-                <a:solidFill>
-                  <a:schemeClr val="tx1"/>
-                </a:solidFill>
-                <a:latin typeface="Arial" charset="0"/>
-              </a:defRPr>
-            </a:lvl1pPr>
-            <a:lvl2pPr marL="566738" algn="l">
-              <a:defRPr sz="2400">
-                <a:solidFill>
-                  <a:schemeClr val="tx1"/>
-                </a:solidFill>
-                <a:latin typeface="Arial" charset="0"/>
-              </a:defRPr>
-            </a:lvl2pPr>
-            <a:lvl3pPr algn="l">
-              <a:defRPr sz="2400">
-                <a:solidFill>
-                  <a:schemeClr val="tx1"/>
-                </a:solidFill>
-                <a:latin typeface="Arial" charset="0"/>
-              </a:defRPr>
-            </a:lvl3pPr>
-            <a:lvl4pPr algn="l">
-              <a:defRPr sz="2400">
-                <a:solidFill>
-                  <a:schemeClr val="tx1"/>
-                </a:solidFill>
-                <a:latin typeface="Arial" charset="0"/>
-              </a:defRPr>
-            </a:lvl4pPr>
-            <a:lvl5pPr algn="l">
-              <a:defRPr sz="2400">
-                <a:solidFill>
-                  <a:schemeClr val="tx1"/>
-                </a:solidFill>
-                <a:latin typeface="Arial" charset="0"/>
-              </a:defRPr>
-            </a:lvl5pPr>
-            <a:lvl6pPr eaLnBrk="0" fontAlgn="base" hangingPunct="0">
-              <a:spcBef>
-                <a:spcPct val="0"/>
-              </a:spcBef>
-              <a:spcAft>
-                <a:spcPct val="0"/>
-              </a:spcAft>
-              <a:defRPr sz="2400">
-                <a:solidFill>
-                  <a:schemeClr val="tx1"/>
-                </a:solidFill>
-                <a:latin typeface="Arial" charset="0"/>
-              </a:defRPr>
-            </a:lvl6pPr>
-            <a:lvl7pPr eaLnBrk="0" fontAlgn="base" hangingPunct="0">
-              <a:spcBef>
-                <a:spcPct val="0"/>
-              </a:spcBef>
-              <a:spcAft>
-                <a:spcPct val="0"/>
-              </a:spcAft>
-              <a:defRPr sz="2400">
-                <a:solidFill>
-                  <a:schemeClr val="tx1"/>
-                </a:solidFill>
-                <a:latin typeface="Arial" charset="0"/>
-              </a:defRPr>
-            </a:lvl7pPr>
-            <a:lvl8pPr eaLnBrk="0" fontAlgn="base" hangingPunct="0">
-              <a:spcBef>
-                <a:spcPct val="0"/>
-              </a:spcBef>
-              <a:spcAft>
-                <a:spcPct val="0"/>
-              </a:spcAft>
-              <a:defRPr sz="2400">
-                <a:solidFill>
-                  <a:schemeClr val="tx1"/>
-                </a:solidFill>
-                <a:latin typeface="Arial" charset="0"/>
-              </a:defRPr>
-            </a:lvl8pPr>
-            <a:lvl9pPr eaLnBrk="0" fontAlgn="base" hangingPunct="0">
-              <a:spcBef>
-                <a:spcPct val="0"/>
-              </a:spcBef>
-              <a:spcAft>
-                <a:spcPct val="0"/>
-              </a:spcAft>
-              <a:defRPr sz="2400">
-                <a:solidFill>
-                  <a:schemeClr val="tx1"/>
-                </a:solidFill>
-                <a:latin typeface="Arial" charset="0"/>
-              </a:defRPr>
-            </a:lvl9pPr>
-          </a:lstStyle>
-          <a:p>
-            <a:pPr eaLnBrk="1" hangingPunct="1">
-              <a:spcBef>
-                <a:spcPct val="30000"/>
-              </a:spcBef>
-            </a:pPr>
-            <a:r>
-              <a:rPr lang="de-DE" altLang="de-DE" sz="1300" b="1" dirty="0">
-                <a:solidFill>
-                  <a:srgbClr val="000000"/>
-                </a:solidFill>
-              </a:rPr>
-              <a:t>BILD</a:t>
-            </a:r>
-          </a:p>
-          <a:p>
-            <a:pPr eaLnBrk="1" hangingPunct="1">
-              <a:spcBef>
-                <a:spcPct val="30000"/>
-              </a:spcBef>
-            </a:pPr>
-            <a:r>
-              <a:rPr lang="de-DE" altLang="de-DE" sz="1300" dirty="0">
-                <a:solidFill>
-                  <a:srgbClr val="000000"/>
-                </a:solidFill>
-              </a:rPr>
-              <a:t>Positionierungsfläche für Bilder.</a:t>
-            </a:r>
-          </a:p>
-          <a:p>
-            <a:pPr eaLnBrk="1" hangingPunct="1">
-              <a:spcBef>
-                <a:spcPct val="30000"/>
-              </a:spcBef>
-            </a:pPr>
-            <a:r>
-              <a:rPr lang="de-DE" altLang="de-DE" sz="1300" dirty="0">
-                <a:solidFill>
-                  <a:srgbClr val="000000"/>
-                </a:solidFill>
-              </a:rPr>
-              <a:t>Bitte in linker oberer Ecke beginnen.</a:t>
-            </a:r>
-          </a:p>
-          <a:p>
-            <a:pPr eaLnBrk="1" hangingPunct="1">
-              <a:spcBef>
-                <a:spcPct val="30000"/>
-              </a:spcBef>
-            </a:pPr>
-            <a:r>
-              <a:rPr lang="de-DE" altLang="de-DE" sz="1300" dirty="0">
-                <a:solidFill>
-                  <a:srgbClr val="000000"/>
-                </a:solidFill>
-              </a:rPr>
-              <a:t>Bis maximal rechte und/oder untere Begrenzung, ggf. Bild beschneiden.</a:t>
-            </a:r>
-          </a:p>
-        </p:txBody>
-      </p:sp>
+      </p:pic>
     </p:spTree>
     <p:extLst>
       <p:ext uri="{BB962C8B-B14F-4D97-AF65-F5344CB8AC3E}">
-        <p14:creationId xmlns:p14="http://schemas.microsoft.com/office/powerpoint/2010/main" val="4041793622"/>
+        <p14:creationId xmlns:p14="http://schemas.microsoft.com/office/powerpoint/2010/main" val="422122669"/>
       </p:ext>
     </p:extLst>
   </p:cSld>
@@ -4643,27 +4656,9 @@
           </a:p>
         </p:txBody>
       </p:sp>
-      <p:graphicFrame>
-        <p:nvGraphicFramePr>
-          <p:cNvPr id="5" name="Object 2"/>
-          <p:cNvGraphicFramePr>
-            <a:graphicFrameLocks noChangeAspect="1"/>
-          </p:cNvGraphicFramePr>
-          <p:nvPr/>
-        </p:nvGraphicFramePr>
-        <p:xfrm>
-          <a:off x="-211487" y="1817566"/>
-          <a:ext cx="8063654" cy="4631092"/>
-        </p:xfrm>
-        <a:graphic>
-          <a:graphicData uri="http://schemas.openxmlformats.org/drawingml/2006/chart">
-            <c:chart xmlns:c="http://schemas.openxmlformats.org/drawingml/2006/chart" xmlns:r="http://schemas.openxmlformats.org/officeDocument/2006/relationships" r:id="rId2"/>
-          </a:graphicData>
-        </a:graphic>
-      </p:graphicFrame>
       <p:sp>
         <p:nvSpPr>
-          <p:cNvPr id="6" name="Rectangle 3"/>
+          <p:cNvPr id="5" name="Rectangle 2"/>
           <p:cNvSpPr>
             <a:spLocks noGrp="1" noChangeArrowheads="1"/>
           </p:cNvSpPr>
@@ -4674,7 +4669,7 @@
         <p:spPr>
           <a:xfrm>
             <a:off x="971550" y="1404000"/>
-            <a:ext cx="7704138" cy="792162"/>
+            <a:ext cx="6984826" cy="792162"/>
           </a:xfrm>
         </p:spPr>
         <p:txBody>
@@ -4683,15 +4678,823 @@
           <a:p>
             <a:r>
               <a:rPr lang="de-DE" altLang="de-DE" dirty="0"/>
-              <a:t>Überschrift Balkendiagramm</a:t>
+              <a:t>Überschrift Bildfolie – zwei Bilder mit Text</a:t>
             </a:r>
+          </a:p>
+        </p:txBody>
+      </p:sp>
+      <p:sp>
+        <p:nvSpPr>
+          <p:cNvPr id="6" name="Rectangle 3"/>
+          <p:cNvSpPr txBox="1">
+            <a:spLocks noChangeArrowheads="1"/>
+          </p:cNvSpPr>
+          <p:nvPr/>
+        </p:nvSpPr>
+        <p:spPr>
+          <a:xfrm>
+            <a:off x="971550" y="5373688"/>
+            <a:ext cx="3744913" cy="863600"/>
+          </a:xfrm>
+          <a:prstGeom prst="rect">
+            <a:avLst/>
+          </a:prstGeom>
+        </p:spPr>
+        <p:txBody>
+          <a:bodyPr/>
+          <a:lstStyle>
+            <a:lvl1pPr algn="l" rtl="0" eaLnBrk="1" fontAlgn="base" hangingPunct="1">
+              <a:lnSpc>
+                <a:spcPct val="110000"/>
+              </a:lnSpc>
+              <a:spcBef>
+                <a:spcPct val="0"/>
+              </a:spcBef>
+              <a:spcAft>
+                <a:spcPct val="20000"/>
+              </a:spcAft>
+              <a:defRPr>
+                <a:solidFill>
+                  <a:schemeClr val="tx1"/>
+                </a:solidFill>
+                <a:latin typeface="+mn-lt"/>
+                <a:ea typeface="+mn-ea"/>
+                <a:cs typeface="+mn-cs"/>
+              </a:defRPr>
+            </a:lvl1pPr>
+            <a:lvl2pPr marL="182563" indent="-180975" algn="l" rtl="0" eaLnBrk="1" fontAlgn="base" hangingPunct="1">
+              <a:lnSpc>
+                <a:spcPct val="110000"/>
+              </a:lnSpc>
+              <a:spcBef>
+                <a:spcPct val="0"/>
+              </a:spcBef>
+              <a:spcAft>
+                <a:spcPct val="20000"/>
+              </a:spcAft>
+              <a:buFont typeface="Arial" charset="0"/>
+              <a:buChar char="•"/>
+              <a:defRPr>
+                <a:solidFill>
+                  <a:schemeClr val="tx1"/>
+                </a:solidFill>
+                <a:latin typeface="+mn-lt"/>
+              </a:defRPr>
+            </a:lvl2pPr>
+            <a:lvl3pPr marL="366713" indent="-182563" algn="l" rtl="0" eaLnBrk="1" fontAlgn="base" hangingPunct="1">
+              <a:lnSpc>
+                <a:spcPct val="110000"/>
+              </a:lnSpc>
+              <a:spcBef>
+                <a:spcPct val="0"/>
+              </a:spcBef>
+              <a:spcAft>
+                <a:spcPct val="20000"/>
+              </a:spcAft>
+              <a:buFont typeface="Arial" charset="0"/>
+              <a:buChar char="•"/>
+              <a:defRPr>
+                <a:solidFill>
+                  <a:schemeClr val="tx1"/>
+                </a:solidFill>
+                <a:latin typeface="+mn-lt"/>
+              </a:defRPr>
+            </a:lvl3pPr>
+            <a:lvl4pPr marL="552450" indent="-184150" algn="l" rtl="0" eaLnBrk="1" fontAlgn="base" hangingPunct="1">
+              <a:lnSpc>
+                <a:spcPct val="110000"/>
+              </a:lnSpc>
+              <a:spcBef>
+                <a:spcPct val="0"/>
+              </a:spcBef>
+              <a:spcAft>
+                <a:spcPct val="20000"/>
+              </a:spcAft>
+              <a:buFont typeface="Arial" charset="0"/>
+              <a:buChar char="•"/>
+              <a:defRPr>
+                <a:solidFill>
+                  <a:schemeClr val="tx1"/>
+                </a:solidFill>
+                <a:latin typeface="+mn-lt"/>
+              </a:defRPr>
+            </a:lvl4pPr>
+            <a:lvl5pPr marL="738188" indent="-184150" algn="l" rtl="0" eaLnBrk="1" fontAlgn="base" hangingPunct="1">
+              <a:lnSpc>
+                <a:spcPct val="110000"/>
+              </a:lnSpc>
+              <a:spcBef>
+                <a:spcPct val="0"/>
+              </a:spcBef>
+              <a:spcAft>
+                <a:spcPct val="20000"/>
+              </a:spcAft>
+              <a:buFont typeface="Arial" charset="0"/>
+              <a:buChar char="•"/>
+              <a:defRPr>
+                <a:solidFill>
+                  <a:schemeClr val="tx1"/>
+                </a:solidFill>
+                <a:latin typeface="+mn-lt"/>
+              </a:defRPr>
+            </a:lvl5pPr>
+            <a:lvl6pPr marL="1195388" indent="-184150" algn="l" rtl="0" eaLnBrk="1" fontAlgn="base" hangingPunct="1">
+              <a:lnSpc>
+                <a:spcPct val="110000"/>
+              </a:lnSpc>
+              <a:spcBef>
+                <a:spcPct val="0"/>
+              </a:spcBef>
+              <a:spcAft>
+                <a:spcPct val="20000"/>
+              </a:spcAft>
+              <a:buFont typeface="Arial" charset="0"/>
+              <a:buChar char="•"/>
+              <a:defRPr>
+                <a:solidFill>
+                  <a:schemeClr val="tx1"/>
+                </a:solidFill>
+                <a:latin typeface="+mn-lt"/>
+              </a:defRPr>
+            </a:lvl6pPr>
+            <a:lvl7pPr marL="1652588" indent="-184150" algn="l" rtl="0" eaLnBrk="1" fontAlgn="base" hangingPunct="1">
+              <a:lnSpc>
+                <a:spcPct val="110000"/>
+              </a:lnSpc>
+              <a:spcBef>
+                <a:spcPct val="0"/>
+              </a:spcBef>
+              <a:spcAft>
+                <a:spcPct val="20000"/>
+              </a:spcAft>
+              <a:buFont typeface="Arial" charset="0"/>
+              <a:buChar char="•"/>
+              <a:defRPr>
+                <a:solidFill>
+                  <a:schemeClr val="tx1"/>
+                </a:solidFill>
+                <a:latin typeface="+mn-lt"/>
+              </a:defRPr>
+            </a:lvl7pPr>
+            <a:lvl8pPr marL="2109788" indent="-184150" algn="l" rtl="0" eaLnBrk="1" fontAlgn="base" hangingPunct="1">
+              <a:lnSpc>
+                <a:spcPct val="110000"/>
+              </a:lnSpc>
+              <a:spcBef>
+                <a:spcPct val="0"/>
+              </a:spcBef>
+              <a:spcAft>
+                <a:spcPct val="20000"/>
+              </a:spcAft>
+              <a:buFont typeface="Arial" charset="0"/>
+              <a:buChar char="•"/>
+              <a:defRPr>
+                <a:solidFill>
+                  <a:schemeClr val="tx1"/>
+                </a:solidFill>
+                <a:latin typeface="+mn-lt"/>
+              </a:defRPr>
+            </a:lvl8pPr>
+            <a:lvl9pPr marL="2566988" indent="-184150" algn="l" rtl="0" eaLnBrk="1" fontAlgn="base" hangingPunct="1">
+              <a:lnSpc>
+                <a:spcPct val="110000"/>
+              </a:lnSpc>
+              <a:spcBef>
+                <a:spcPct val="0"/>
+              </a:spcBef>
+              <a:spcAft>
+                <a:spcPct val="20000"/>
+              </a:spcAft>
+              <a:buFont typeface="Arial" charset="0"/>
+              <a:buChar char="•"/>
+              <a:defRPr>
+                <a:solidFill>
+                  <a:schemeClr val="tx1"/>
+                </a:solidFill>
+                <a:latin typeface="+mn-lt"/>
+              </a:defRPr>
+            </a:lvl9pPr>
+          </a:lstStyle>
+          <a:p>
+            <a:r>
+              <a:rPr lang="de-DE" altLang="de-DE" sz="1500" kern="0"/>
+              <a:t>Mit seiner Aufnahme in die Elite war Knechts Leben auf eine andre Ebene verpflanzt.</a:t>
+            </a:r>
+          </a:p>
+        </p:txBody>
+      </p:sp>
+      <p:sp>
+        <p:nvSpPr>
+          <p:cNvPr id="7" name="Rectangle 4"/>
+          <p:cNvSpPr>
+            <a:spLocks noChangeArrowheads="1"/>
+          </p:cNvSpPr>
+          <p:nvPr/>
+        </p:nvSpPr>
+        <p:spPr bwMode="invGray">
+          <a:xfrm>
+            <a:off x="971550" y="2060848"/>
+            <a:ext cx="3744913" cy="3096940"/>
+          </a:xfrm>
+          <a:prstGeom prst="rect">
+            <a:avLst/>
+          </a:prstGeom>
+          <a:solidFill>
+            <a:srgbClr val="C0C0C0"/>
+          </a:solidFill>
+          <a:ln>
+            <a:noFill/>
+          </a:ln>
+          <a:effectLst/>
+          <a:extLst>
+            <a:ext uri="{91240B29-F687-4F45-9708-019B960494DF}">
+              <a14:hiddenLine xmlns:a14="http://schemas.microsoft.com/office/drawing/2010/main" w="19050" algn="ctr">
+                <a:solidFill>
+                  <a:schemeClr val="tx2"/>
+                </a:solidFill>
+                <a:miter lim="800000"/>
+                <a:headEnd/>
+                <a:tailEnd/>
+              </a14:hiddenLine>
+            </a:ext>
+            <a:ext uri="{AF507438-7753-43E0-B8FC-AC1667EBCBE1}">
+              <a14:hiddenEffects xmlns:a14="http://schemas.microsoft.com/office/drawing/2010/main">
+                <a:effectLst>
+                  <a:outerShdw dist="35921" dir="2700000" algn="ctr" rotWithShape="0">
+                    <a:schemeClr val="bg2"/>
+                  </a:outerShdw>
+                </a:effectLst>
+              </a14:hiddenEffects>
+            </a:ext>
+          </a:extLst>
+        </p:spPr>
+        <p:txBody>
+          <a:bodyPr lIns="0" tIns="0" rIns="0" bIns="0" anchor="ctr"/>
+          <a:lstStyle>
+            <a:lvl1pPr marL="376238" algn="l">
+              <a:defRPr sz="2400">
+                <a:solidFill>
+                  <a:schemeClr val="tx1"/>
+                </a:solidFill>
+                <a:latin typeface="Arial" charset="0"/>
+              </a:defRPr>
+            </a:lvl1pPr>
+            <a:lvl2pPr marL="566738" algn="l">
+              <a:defRPr sz="2400">
+                <a:solidFill>
+                  <a:schemeClr val="tx1"/>
+                </a:solidFill>
+                <a:latin typeface="Arial" charset="0"/>
+              </a:defRPr>
+            </a:lvl2pPr>
+            <a:lvl3pPr algn="l">
+              <a:defRPr sz="2400">
+                <a:solidFill>
+                  <a:schemeClr val="tx1"/>
+                </a:solidFill>
+                <a:latin typeface="Arial" charset="0"/>
+              </a:defRPr>
+            </a:lvl3pPr>
+            <a:lvl4pPr algn="l">
+              <a:defRPr sz="2400">
+                <a:solidFill>
+                  <a:schemeClr val="tx1"/>
+                </a:solidFill>
+                <a:latin typeface="Arial" charset="0"/>
+              </a:defRPr>
+            </a:lvl4pPr>
+            <a:lvl5pPr algn="l">
+              <a:defRPr sz="2400">
+                <a:solidFill>
+                  <a:schemeClr val="tx1"/>
+                </a:solidFill>
+                <a:latin typeface="Arial" charset="0"/>
+              </a:defRPr>
+            </a:lvl5pPr>
+            <a:lvl6pPr eaLnBrk="0" fontAlgn="base" hangingPunct="0">
+              <a:spcBef>
+                <a:spcPct val="0"/>
+              </a:spcBef>
+              <a:spcAft>
+                <a:spcPct val="0"/>
+              </a:spcAft>
+              <a:defRPr sz="2400">
+                <a:solidFill>
+                  <a:schemeClr val="tx1"/>
+                </a:solidFill>
+                <a:latin typeface="Arial" charset="0"/>
+              </a:defRPr>
+            </a:lvl6pPr>
+            <a:lvl7pPr eaLnBrk="0" fontAlgn="base" hangingPunct="0">
+              <a:spcBef>
+                <a:spcPct val="0"/>
+              </a:spcBef>
+              <a:spcAft>
+                <a:spcPct val="0"/>
+              </a:spcAft>
+              <a:defRPr sz="2400">
+                <a:solidFill>
+                  <a:schemeClr val="tx1"/>
+                </a:solidFill>
+                <a:latin typeface="Arial" charset="0"/>
+              </a:defRPr>
+            </a:lvl7pPr>
+            <a:lvl8pPr eaLnBrk="0" fontAlgn="base" hangingPunct="0">
+              <a:spcBef>
+                <a:spcPct val="0"/>
+              </a:spcBef>
+              <a:spcAft>
+                <a:spcPct val="0"/>
+              </a:spcAft>
+              <a:defRPr sz="2400">
+                <a:solidFill>
+                  <a:schemeClr val="tx1"/>
+                </a:solidFill>
+                <a:latin typeface="Arial" charset="0"/>
+              </a:defRPr>
+            </a:lvl8pPr>
+            <a:lvl9pPr eaLnBrk="0" fontAlgn="base" hangingPunct="0">
+              <a:spcBef>
+                <a:spcPct val="0"/>
+              </a:spcBef>
+              <a:spcAft>
+                <a:spcPct val="0"/>
+              </a:spcAft>
+              <a:defRPr sz="2400">
+                <a:solidFill>
+                  <a:schemeClr val="tx1"/>
+                </a:solidFill>
+                <a:latin typeface="Arial" charset="0"/>
+              </a:defRPr>
+            </a:lvl9pPr>
+          </a:lstStyle>
+          <a:p>
+            <a:pPr eaLnBrk="1" hangingPunct="1">
+              <a:spcBef>
+                <a:spcPct val="30000"/>
+              </a:spcBef>
+            </a:pPr>
+            <a:r>
+              <a:rPr lang="de-DE" altLang="de-DE" sz="1300" b="1" dirty="0">
+                <a:solidFill>
+                  <a:srgbClr val="000000"/>
+                </a:solidFill>
+              </a:rPr>
+              <a:t>BILD</a:t>
+            </a:r>
+          </a:p>
+          <a:p>
+            <a:pPr eaLnBrk="1" hangingPunct="1">
+              <a:spcBef>
+                <a:spcPct val="30000"/>
+              </a:spcBef>
+            </a:pPr>
+            <a:r>
+              <a:rPr lang="de-DE" altLang="de-DE" sz="1300" dirty="0">
+                <a:solidFill>
+                  <a:srgbClr val="000000"/>
+                </a:solidFill>
+              </a:rPr>
+              <a:t>Positionierungsfläche für Bilder.</a:t>
+            </a:r>
+          </a:p>
+          <a:p>
+            <a:pPr eaLnBrk="1" hangingPunct="1">
+              <a:spcBef>
+                <a:spcPct val="30000"/>
+              </a:spcBef>
+            </a:pPr>
+            <a:r>
+              <a:rPr lang="de-DE" altLang="de-DE" sz="1300" dirty="0">
+                <a:solidFill>
+                  <a:srgbClr val="000000"/>
+                </a:solidFill>
+              </a:rPr>
+              <a:t>Bitte in linker oberer Ecke beginnen.</a:t>
+            </a:r>
+          </a:p>
+          <a:p>
+            <a:pPr eaLnBrk="1" hangingPunct="1">
+              <a:spcBef>
+                <a:spcPct val="30000"/>
+              </a:spcBef>
+            </a:pPr>
+            <a:r>
+              <a:rPr lang="de-DE" altLang="de-DE" sz="1300" dirty="0">
+                <a:solidFill>
+                  <a:srgbClr val="000000"/>
+                </a:solidFill>
+              </a:rPr>
+              <a:t>Bis maximal rechte und/oder untere Begrenzung, ggf. Bild beschneiden.</a:t>
+            </a:r>
+          </a:p>
+          <a:p>
+            <a:pPr eaLnBrk="1" hangingPunct="1">
+              <a:spcBef>
+                <a:spcPct val="30000"/>
+              </a:spcBef>
+            </a:pPr>
+            <a:endParaRPr lang="de-DE" altLang="de-DE" sz="1300" dirty="0">
+              <a:solidFill>
+                <a:srgbClr val="000000"/>
+              </a:solidFill>
+            </a:endParaRPr>
+          </a:p>
+        </p:txBody>
+      </p:sp>
+      <p:sp>
+        <p:nvSpPr>
+          <p:cNvPr id="8" name="Rectangle 11"/>
+          <p:cNvSpPr>
+            <a:spLocks noChangeArrowheads="1"/>
+          </p:cNvSpPr>
+          <p:nvPr/>
+        </p:nvSpPr>
+        <p:spPr bwMode="gray">
+          <a:xfrm>
+            <a:off x="4932363" y="5373688"/>
+            <a:ext cx="3743325" cy="863600"/>
+          </a:xfrm>
+          <a:prstGeom prst="rect">
+            <a:avLst/>
+          </a:prstGeom>
+          <a:noFill/>
+          <a:ln>
+            <a:noFill/>
+          </a:ln>
+          <a:effectLst/>
+          <a:extLst>
+            <a:ext uri="{909E8E84-426E-40DD-AFC4-6F175D3DCCD1}">
+              <a14:hiddenFill xmlns:a14="http://schemas.microsoft.com/office/drawing/2010/main">
+                <a:solidFill>
+                  <a:schemeClr val="tx2"/>
+                </a:solidFill>
+              </a14:hiddenFill>
+            </a:ext>
+            <a:ext uri="{91240B29-F687-4F45-9708-019B960494DF}">
+              <a14:hiddenLine xmlns:a14="http://schemas.microsoft.com/office/drawing/2010/main" w="9525">
+                <a:solidFill>
+                  <a:schemeClr val="tx1"/>
+                </a:solidFill>
+                <a:miter lim="800000"/>
+                <a:headEnd/>
+                <a:tailEnd/>
+              </a14:hiddenLine>
+            </a:ext>
+            <a:ext uri="{AF507438-7753-43E0-B8FC-AC1667EBCBE1}">
+              <a14:hiddenEffects xmlns:a14="http://schemas.microsoft.com/office/drawing/2010/main">
+                <a:effectLst>
+                  <a:outerShdw dist="35921" dir="2700000" algn="ctr" rotWithShape="0">
+                    <a:schemeClr val="bg2"/>
+                  </a:outerShdw>
+                </a:effectLst>
+              </a14:hiddenEffects>
+            </a:ext>
+          </a:extLst>
+        </p:spPr>
+        <p:txBody>
+          <a:bodyPr lIns="0" tIns="0" rIns="0" bIns="0"/>
+          <a:lstStyle>
+            <a:lvl1pPr algn="l">
+              <a:defRPr sz="2400">
+                <a:solidFill>
+                  <a:schemeClr val="tx1"/>
+                </a:solidFill>
+                <a:latin typeface="Arial" charset="0"/>
+              </a:defRPr>
+            </a:lvl1pPr>
+            <a:lvl2pPr marL="188913" indent="133350" algn="l">
+              <a:defRPr sz="2400">
+                <a:solidFill>
+                  <a:schemeClr val="tx1"/>
+                </a:solidFill>
+                <a:latin typeface="Arial" charset="0"/>
+              </a:defRPr>
+            </a:lvl2pPr>
+            <a:lvl3pPr marL="339725" indent="123825" algn="l">
+              <a:defRPr sz="2400">
+                <a:solidFill>
+                  <a:schemeClr val="tx1"/>
+                </a:solidFill>
+                <a:latin typeface="Arial" charset="0"/>
+              </a:defRPr>
+            </a:lvl3pPr>
+            <a:lvl4pPr marL="479425" indent="123825" algn="l">
+              <a:defRPr sz="2400">
+                <a:solidFill>
+                  <a:schemeClr val="tx1"/>
+                </a:solidFill>
+                <a:latin typeface="Arial" charset="0"/>
+              </a:defRPr>
+            </a:lvl4pPr>
+            <a:lvl5pPr marL="622300" indent="120650" algn="l">
+              <a:defRPr sz="2400">
+                <a:solidFill>
+                  <a:schemeClr val="tx1"/>
+                </a:solidFill>
+                <a:latin typeface="Arial" charset="0"/>
+              </a:defRPr>
+            </a:lvl5pPr>
+            <a:lvl6pPr marL="1079500" indent="120650" eaLnBrk="0" fontAlgn="base" hangingPunct="0">
+              <a:spcBef>
+                <a:spcPct val="0"/>
+              </a:spcBef>
+              <a:spcAft>
+                <a:spcPct val="0"/>
+              </a:spcAft>
+              <a:defRPr sz="2400">
+                <a:solidFill>
+                  <a:schemeClr val="tx1"/>
+                </a:solidFill>
+                <a:latin typeface="Arial" charset="0"/>
+              </a:defRPr>
+            </a:lvl6pPr>
+            <a:lvl7pPr marL="1536700" indent="120650" eaLnBrk="0" fontAlgn="base" hangingPunct="0">
+              <a:spcBef>
+                <a:spcPct val="0"/>
+              </a:spcBef>
+              <a:spcAft>
+                <a:spcPct val="0"/>
+              </a:spcAft>
+              <a:defRPr sz="2400">
+                <a:solidFill>
+                  <a:schemeClr val="tx1"/>
+                </a:solidFill>
+                <a:latin typeface="Arial" charset="0"/>
+              </a:defRPr>
+            </a:lvl7pPr>
+            <a:lvl8pPr marL="1993900" indent="120650" eaLnBrk="0" fontAlgn="base" hangingPunct="0">
+              <a:spcBef>
+                <a:spcPct val="0"/>
+              </a:spcBef>
+              <a:spcAft>
+                <a:spcPct val="0"/>
+              </a:spcAft>
+              <a:defRPr sz="2400">
+                <a:solidFill>
+                  <a:schemeClr val="tx1"/>
+                </a:solidFill>
+                <a:latin typeface="Arial" charset="0"/>
+              </a:defRPr>
+            </a:lvl8pPr>
+            <a:lvl9pPr marL="2451100" indent="120650" eaLnBrk="0" fontAlgn="base" hangingPunct="0">
+              <a:spcBef>
+                <a:spcPct val="0"/>
+              </a:spcBef>
+              <a:spcAft>
+                <a:spcPct val="0"/>
+              </a:spcAft>
+              <a:defRPr sz="2400">
+                <a:solidFill>
+                  <a:schemeClr val="tx1"/>
+                </a:solidFill>
+                <a:latin typeface="Arial" charset="0"/>
+              </a:defRPr>
+            </a:lvl9pPr>
+          </a:lstStyle>
+          <a:p>
+            <a:pPr eaLnBrk="1" hangingPunct="1">
+              <a:lnSpc>
+                <a:spcPct val="110000"/>
+              </a:lnSpc>
+              <a:spcAft>
+                <a:spcPct val="20000"/>
+              </a:spcAft>
+            </a:pPr>
+            <a:r>
+              <a:rPr lang="de-DE" altLang="de-DE" sz="1500">
+                <a:solidFill>
+                  <a:srgbClr val="000000"/>
+                </a:solidFill>
+              </a:rPr>
+              <a:t>Es war der erste und entscheidende Schritt in seiner Entwicklung geschehen. </a:t>
+            </a:r>
+          </a:p>
+        </p:txBody>
+      </p:sp>
+      <p:sp>
+        <p:nvSpPr>
+          <p:cNvPr id="9" name="Rectangle 12"/>
+          <p:cNvSpPr>
+            <a:spLocks noChangeArrowheads="1"/>
+          </p:cNvSpPr>
+          <p:nvPr/>
+        </p:nvSpPr>
+        <p:spPr bwMode="invGray">
+          <a:xfrm>
+            <a:off x="4932363" y="2060848"/>
+            <a:ext cx="3743325" cy="3096940"/>
+          </a:xfrm>
+          <a:prstGeom prst="rect">
+            <a:avLst/>
+          </a:prstGeom>
+          <a:solidFill>
+            <a:srgbClr val="C0C0C0"/>
+          </a:solidFill>
+          <a:ln>
+            <a:noFill/>
+          </a:ln>
+          <a:effectLst/>
+          <a:extLst>
+            <a:ext uri="{91240B29-F687-4F45-9708-019B960494DF}">
+              <a14:hiddenLine xmlns:a14="http://schemas.microsoft.com/office/drawing/2010/main" w="19050" algn="ctr">
+                <a:solidFill>
+                  <a:schemeClr val="tx2"/>
+                </a:solidFill>
+                <a:miter lim="800000"/>
+                <a:headEnd/>
+                <a:tailEnd/>
+              </a14:hiddenLine>
+            </a:ext>
+            <a:ext uri="{AF507438-7753-43E0-B8FC-AC1667EBCBE1}">
+              <a14:hiddenEffects xmlns:a14="http://schemas.microsoft.com/office/drawing/2010/main">
+                <a:effectLst>
+                  <a:outerShdw dist="35921" dir="2700000" algn="ctr" rotWithShape="0">
+                    <a:schemeClr val="bg2"/>
+                  </a:outerShdw>
+                </a:effectLst>
+              </a14:hiddenEffects>
+            </a:ext>
+          </a:extLst>
+        </p:spPr>
+        <p:txBody>
+          <a:bodyPr lIns="0" tIns="0" rIns="0" bIns="0" anchor="ctr"/>
+          <a:lstStyle>
+            <a:lvl1pPr marL="376238" algn="l">
+              <a:defRPr sz="2400">
+                <a:solidFill>
+                  <a:schemeClr val="tx1"/>
+                </a:solidFill>
+                <a:latin typeface="Arial" charset="0"/>
+              </a:defRPr>
+            </a:lvl1pPr>
+            <a:lvl2pPr marL="566738" algn="l">
+              <a:defRPr sz="2400">
+                <a:solidFill>
+                  <a:schemeClr val="tx1"/>
+                </a:solidFill>
+                <a:latin typeface="Arial" charset="0"/>
+              </a:defRPr>
+            </a:lvl2pPr>
+            <a:lvl3pPr algn="l">
+              <a:defRPr sz="2400">
+                <a:solidFill>
+                  <a:schemeClr val="tx1"/>
+                </a:solidFill>
+                <a:latin typeface="Arial" charset="0"/>
+              </a:defRPr>
+            </a:lvl3pPr>
+            <a:lvl4pPr algn="l">
+              <a:defRPr sz="2400">
+                <a:solidFill>
+                  <a:schemeClr val="tx1"/>
+                </a:solidFill>
+                <a:latin typeface="Arial" charset="0"/>
+              </a:defRPr>
+            </a:lvl4pPr>
+            <a:lvl5pPr algn="l">
+              <a:defRPr sz="2400">
+                <a:solidFill>
+                  <a:schemeClr val="tx1"/>
+                </a:solidFill>
+                <a:latin typeface="Arial" charset="0"/>
+              </a:defRPr>
+            </a:lvl5pPr>
+            <a:lvl6pPr eaLnBrk="0" fontAlgn="base" hangingPunct="0">
+              <a:spcBef>
+                <a:spcPct val="0"/>
+              </a:spcBef>
+              <a:spcAft>
+                <a:spcPct val="0"/>
+              </a:spcAft>
+              <a:defRPr sz="2400">
+                <a:solidFill>
+                  <a:schemeClr val="tx1"/>
+                </a:solidFill>
+                <a:latin typeface="Arial" charset="0"/>
+              </a:defRPr>
+            </a:lvl6pPr>
+            <a:lvl7pPr eaLnBrk="0" fontAlgn="base" hangingPunct="0">
+              <a:spcBef>
+                <a:spcPct val="0"/>
+              </a:spcBef>
+              <a:spcAft>
+                <a:spcPct val="0"/>
+              </a:spcAft>
+              <a:defRPr sz="2400">
+                <a:solidFill>
+                  <a:schemeClr val="tx1"/>
+                </a:solidFill>
+                <a:latin typeface="Arial" charset="0"/>
+              </a:defRPr>
+            </a:lvl7pPr>
+            <a:lvl8pPr eaLnBrk="0" fontAlgn="base" hangingPunct="0">
+              <a:spcBef>
+                <a:spcPct val="0"/>
+              </a:spcBef>
+              <a:spcAft>
+                <a:spcPct val="0"/>
+              </a:spcAft>
+              <a:defRPr sz="2400">
+                <a:solidFill>
+                  <a:schemeClr val="tx1"/>
+                </a:solidFill>
+                <a:latin typeface="Arial" charset="0"/>
+              </a:defRPr>
+            </a:lvl8pPr>
+            <a:lvl9pPr eaLnBrk="0" fontAlgn="base" hangingPunct="0">
+              <a:spcBef>
+                <a:spcPct val="0"/>
+              </a:spcBef>
+              <a:spcAft>
+                <a:spcPct val="0"/>
+              </a:spcAft>
+              <a:defRPr sz="2400">
+                <a:solidFill>
+                  <a:schemeClr val="tx1"/>
+                </a:solidFill>
+                <a:latin typeface="Arial" charset="0"/>
+              </a:defRPr>
+            </a:lvl9pPr>
+          </a:lstStyle>
+          <a:p>
+            <a:pPr eaLnBrk="1" hangingPunct="1">
+              <a:spcBef>
+                <a:spcPct val="30000"/>
+              </a:spcBef>
+            </a:pPr>
+            <a:r>
+              <a:rPr lang="de-DE" altLang="de-DE" sz="1300" b="1" dirty="0">
+                <a:solidFill>
+                  <a:srgbClr val="000000"/>
+                </a:solidFill>
+              </a:rPr>
+              <a:t>BILD</a:t>
+            </a:r>
+          </a:p>
+          <a:p>
+            <a:pPr eaLnBrk="1" hangingPunct="1">
+              <a:spcBef>
+                <a:spcPct val="30000"/>
+              </a:spcBef>
+            </a:pPr>
+            <a:r>
+              <a:rPr lang="de-DE" altLang="de-DE" sz="1300" dirty="0">
+                <a:solidFill>
+                  <a:srgbClr val="000000"/>
+                </a:solidFill>
+              </a:rPr>
+              <a:t>Positionierungsfläche für Bilder.</a:t>
+            </a:r>
+          </a:p>
+          <a:p>
+            <a:pPr eaLnBrk="1" hangingPunct="1">
+              <a:spcBef>
+                <a:spcPct val="30000"/>
+              </a:spcBef>
+            </a:pPr>
+            <a:r>
+              <a:rPr lang="de-DE" altLang="de-DE" sz="1300" dirty="0">
+                <a:solidFill>
+                  <a:srgbClr val="000000"/>
+                </a:solidFill>
+              </a:rPr>
+              <a:t>Bitte in linker oberer Ecke beginnen.</a:t>
+            </a:r>
+          </a:p>
+          <a:p>
+            <a:pPr eaLnBrk="1" hangingPunct="1">
+              <a:spcBef>
+                <a:spcPct val="30000"/>
+              </a:spcBef>
+            </a:pPr>
+            <a:r>
+              <a:rPr lang="de-DE" altLang="de-DE" sz="1300" dirty="0">
+                <a:solidFill>
+                  <a:srgbClr val="000000"/>
+                </a:solidFill>
+              </a:rPr>
+              <a:t>Bis maximal rechte und/oder untere Begrenzung, ggf. Bild beschneiden.</a:t>
+            </a:r>
+          </a:p>
+          <a:p>
+            <a:pPr eaLnBrk="1" hangingPunct="1">
+              <a:spcBef>
+                <a:spcPct val="30000"/>
+              </a:spcBef>
+            </a:pPr>
+            <a:endParaRPr lang="de-DE" altLang="de-DE" sz="1300" dirty="0">
+              <a:solidFill>
+                <a:srgbClr val="000000"/>
+              </a:solidFill>
+            </a:endParaRPr>
           </a:p>
         </p:txBody>
       </p:sp>
     </p:spTree>
     <p:extLst>
       <p:ext uri="{BB962C8B-B14F-4D97-AF65-F5344CB8AC3E}">
-        <p14:creationId xmlns:p14="http://schemas.microsoft.com/office/powerpoint/2010/main" val="301614500"/>
+        <p14:creationId xmlns:p14="http://schemas.microsoft.com/office/powerpoint/2010/main" val="1276860995"/>
       </p:ext>
     </p:extLst>
   </p:cSld>
@@ -4766,33 +5569,9 @@
           </a:p>
         </p:txBody>
       </p:sp>
-      <p:graphicFrame>
-        <p:nvGraphicFramePr>
-          <p:cNvPr id="5" name="Object 2"/>
-          <p:cNvGraphicFramePr>
-            <a:graphicFrameLocks noChangeAspect="1"/>
-          </p:cNvGraphicFramePr>
-          <p:nvPr>
-            <p:extLst>
-              <p:ext uri="{D42A27DB-BD31-4B8C-83A1-F6EECF244321}">
-                <p14:modId xmlns:p14="http://schemas.microsoft.com/office/powerpoint/2010/main" val="2216884294"/>
-              </p:ext>
-            </p:extLst>
-          </p:nvPr>
-        </p:nvGraphicFramePr>
-        <p:xfrm>
-          <a:off x="467544" y="2132856"/>
-          <a:ext cx="5974486" cy="3778785"/>
-        </p:xfrm>
-        <a:graphic>
-          <a:graphicData uri="http://schemas.openxmlformats.org/drawingml/2006/chart">
-            <c:chart xmlns:c="http://schemas.openxmlformats.org/drawingml/2006/chart" xmlns:r="http://schemas.openxmlformats.org/officeDocument/2006/relationships" r:id="rId2"/>
-          </a:graphicData>
-        </a:graphic>
-      </p:graphicFrame>
       <p:sp>
         <p:nvSpPr>
-          <p:cNvPr id="6" name="Rectangle 3"/>
+          <p:cNvPr id="5" name="Rectangle 2"/>
           <p:cNvSpPr>
             <a:spLocks noGrp="1" noChangeArrowheads="1"/>
           </p:cNvSpPr>
@@ -4812,7 +5591,435 @@
           <a:p>
             <a:r>
               <a:rPr lang="de-DE" altLang="de-DE" dirty="0"/>
-              <a:t>Überschrift Tortendiagramm</a:t>
+              <a:t>Überschrift Bildfolie – Text-Bild-Kombination</a:t>
+            </a:r>
+          </a:p>
+        </p:txBody>
+      </p:sp>
+      <p:sp>
+        <p:nvSpPr>
+          <p:cNvPr id="6" name="Rectangle 3"/>
+          <p:cNvSpPr txBox="1">
+            <a:spLocks noChangeArrowheads="1"/>
+          </p:cNvSpPr>
+          <p:nvPr/>
+        </p:nvSpPr>
+        <p:spPr>
+          <a:xfrm>
+            <a:off x="4932363" y="2160000"/>
+            <a:ext cx="3743325" cy="3600450"/>
+          </a:xfrm>
+          <a:prstGeom prst="rect">
+            <a:avLst/>
+          </a:prstGeom>
+        </p:spPr>
+        <p:txBody>
+          <a:bodyPr/>
+          <a:lstStyle>
+            <a:lvl1pPr algn="l" rtl="0" eaLnBrk="1" fontAlgn="base" hangingPunct="1">
+              <a:lnSpc>
+                <a:spcPct val="110000"/>
+              </a:lnSpc>
+              <a:spcBef>
+                <a:spcPct val="0"/>
+              </a:spcBef>
+              <a:spcAft>
+                <a:spcPct val="20000"/>
+              </a:spcAft>
+              <a:defRPr>
+                <a:solidFill>
+                  <a:schemeClr val="tx1"/>
+                </a:solidFill>
+                <a:latin typeface="+mn-lt"/>
+                <a:ea typeface="+mn-ea"/>
+                <a:cs typeface="+mn-cs"/>
+              </a:defRPr>
+            </a:lvl1pPr>
+            <a:lvl2pPr marL="182563" indent="-180975" algn="l" rtl="0" eaLnBrk="1" fontAlgn="base" hangingPunct="1">
+              <a:lnSpc>
+                <a:spcPct val="110000"/>
+              </a:lnSpc>
+              <a:spcBef>
+                <a:spcPct val="0"/>
+              </a:spcBef>
+              <a:spcAft>
+                <a:spcPct val="20000"/>
+              </a:spcAft>
+              <a:buFont typeface="Arial" charset="0"/>
+              <a:buChar char="•"/>
+              <a:defRPr>
+                <a:solidFill>
+                  <a:schemeClr val="tx1"/>
+                </a:solidFill>
+                <a:latin typeface="+mn-lt"/>
+              </a:defRPr>
+            </a:lvl2pPr>
+            <a:lvl3pPr marL="366713" indent="-182563" algn="l" rtl="0" eaLnBrk="1" fontAlgn="base" hangingPunct="1">
+              <a:lnSpc>
+                <a:spcPct val="110000"/>
+              </a:lnSpc>
+              <a:spcBef>
+                <a:spcPct val="0"/>
+              </a:spcBef>
+              <a:spcAft>
+                <a:spcPct val="20000"/>
+              </a:spcAft>
+              <a:buFont typeface="Arial" charset="0"/>
+              <a:buChar char="•"/>
+              <a:defRPr>
+                <a:solidFill>
+                  <a:schemeClr val="tx1"/>
+                </a:solidFill>
+                <a:latin typeface="+mn-lt"/>
+              </a:defRPr>
+            </a:lvl3pPr>
+            <a:lvl4pPr marL="552450" indent="-184150" algn="l" rtl="0" eaLnBrk="1" fontAlgn="base" hangingPunct="1">
+              <a:lnSpc>
+                <a:spcPct val="110000"/>
+              </a:lnSpc>
+              <a:spcBef>
+                <a:spcPct val="0"/>
+              </a:spcBef>
+              <a:spcAft>
+                <a:spcPct val="20000"/>
+              </a:spcAft>
+              <a:buFont typeface="Arial" charset="0"/>
+              <a:buChar char="•"/>
+              <a:defRPr>
+                <a:solidFill>
+                  <a:schemeClr val="tx1"/>
+                </a:solidFill>
+                <a:latin typeface="+mn-lt"/>
+              </a:defRPr>
+            </a:lvl4pPr>
+            <a:lvl5pPr marL="738188" indent="-184150" algn="l" rtl="0" eaLnBrk="1" fontAlgn="base" hangingPunct="1">
+              <a:lnSpc>
+                <a:spcPct val="110000"/>
+              </a:lnSpc>
+              <a:spcBef>
+                <a:spcPct val="0"/>
+              </a:spcBef>
+              <a:spcAft>
+                <a:spcPct val="20000"/>
+              </a:spcAft>
+              <a:buFont typeface="Arial" charset="0"/>
+              <a:buChar char="•"/>
+              <a:defRPr>
+                <a:solidFill>
+                  <a:schemeClr val="tx1"/>
+                </a:solidFill>
+                <a:latin typeface="+mn-lt"/>
+              </a:defRPr>
+            </a:lvl5pPr>
+            <a:lvl6pPr marL="1195388" indent="-184150" algn="l" rtl="0" eaLnBrk="1" fontAlgn="base" hangingPunct="1">
+              <a:lnSpc>
+                <a:spcPct val="110000"/>
+              </a:lnSpc>
+              <a:spcBef>
+                <a:spcPct val="0"/>
+              </a:spcBef>
+              <a:spcAft>
+                <a:spcPct val="20000"/>
+              </a:spcAft>
+              <a:buFont typeface="Arial" charset="0"/>
+              <a:buChar char="•"/>
+              <a:defRPr>
+                <a:solidFill>
+                  <a:schemeClr val="tx1"/>
+                </a:solidFill>
+                <a:latin typeface="+mn-lt"/>
+              </a:defRPr>
+            </a:lvl6pPr>
+            <a:lvl7pPr marL="1652588" indent="-184150" algn="l" rtl="0" eaLnBrk="1" fontAlgn="base" hangingPunct="1">
+              <a:lnSpc>
+                <a:spcPct val="110000"/>
+              </a:lnSpc>
+              <a:spcBef>
+                <a:spcPct val="0"/>
+              </a:spcBef>
+              <a:spcAft>
+                <a:spcPct val="20000"/>
+              </a:spcAft>
+              <a:buFont typeface="Arial" charset="0"/>
+              <a:buChar char="•"/>
+              <a:defRPr>
+                <a:solidFill>
+                  <a:schemeClr val="tx1"/>
+                </a:solidFill>
+                <a:latin typeface="+mn-lt"/>
+              </a:defRPr>
+            </a:lvl7pPr>
+            <a:lvl8pPr marL="2109788" indent="-184150" algn="l" rtl="0" eaLnBrk="1" fontAlgn="base" hangingPunct="1">
+              <a:lnSpc>
+                <a:spcPct val="110000"/>
+              </a:lnSpc>
+              <a:spcBef>
+                <a:spcPct val="0"/>
+              </a:spcBef>
+              <a:spcAft>
+                <a:spcPct val="20000"/>
+              </a:spcAft>
+              <a:buFont typeface="Arial" charset="0"/>
+              <a:buChar char="•"/>
+              <a:defRPr>
+                <a:solidFill>
+                  <a:schemeClr val="tx1"/>
+                </a:solidFill>
+                <a:latin typeface="+mn-lt"/>
+              </a:defRPr>
+            </a:lvl8pPr>
+            <a:lvl9pPr marL="2566988" indent="-184150" algn="l" rtl="0" eaLnBrk="1" fontAlgn="base" hangingPunct="1">
+              <a:lnSpc>
+                <a:spcPct val="110000"/>
+              </a:lnSpc>
+              <a:spcBef>
+                <a:spcPct val="0"/>
+              </a:spcBef>
+              <a:spcAft>
+                <a:spcPct val="20000"/>
+              </a:spcAft>
+              <a:buFont typeface="Arial" charset="0"/>
+              <a:buChar char="•"/>
+              <a:defRPr>
+                <a:solidFill>
+                  <a:schemeClr val="tx1"/>
+                </a:solidFill>
+                <a:latin typeface="+mn-lt"/>
+              </a:defRPr>
+            </a:lvl9pPr>
+          </a:lstStyle>
+          <a:p>
+            <a:r>
+              <a:rPr lang="de-DE" altLang="de-DE" kern="0"/>
+              <a:t>Es war der erste und entscheidende Schritt in seiner Entwicklung geschehen.</a:t>
+            </a:r>
+          </a:p>
+          <a:p>
+            <a:pPr marL="134938" lvl="1" indent="-133350"/>
+            <a:r>
+              <a:rPr lang="de-DE" altLang="de-DE" kern="0"/>
+              <a:t>Die amtliche Aufnahme in die Elite mit dem innern</a:t>
+            </a:r>
+          </a:p>
+          <a:p>
+            <a:pPr marL="134938" lvl="1" indent="-133350"/>
+            <a:r>
+              <a:rPr lang="de-DE" altLang="de-DE" kern="0"/>
+              <a:t>Erlebnis der Berufung zusammenfällt. </a:t>
+            </a:r>
+          </a:p>
+          <a:p>
+            <a:pPr marL="134938" lvl="1" indent="-133350"/>
+            <a:r>
+              <a:rPr lang="de-DE" altLang="de-DE" kern="0"/>
+              <a:t>Es geht durchaus nicht allen Eliteschülern so</a:t>
+            </a:r>
+          </a:p>
+        </p:txBody>
+      </p:sp>
+      <p:sp>
+        <p:nvSpPr>
+          <p:cNvPr id="7" name="Rectangle 4"/>
+          <p:cNvSpPr>
+            <a:spLocks noChangeArrowheads="1"/>
+          </p:cNvSpPr>
+          <p:nvPr/>
+        </p:nvSpPr>
+        <p:spPr bwMode="invGray">
+          <a:xfrm>
+            <a:off x="971550" y="2160000"/>
+            <a:ext cx="3744913" cy="3600450"/>
+          </a:xfrm>
+          <a:prstGeom prst="rect">
+            <a:avLst/>
+          </a:prstGeom>
+          <a:solidFill>
+            <a:srgbClr val="C0C0C0"/>
+          </a:solidFill>
+          <a:ln>
+            <a:noFill/>
+          </a:ln>
+          <a:effectLst/>
+          <a:extLst>
+            <a:ext uri="{91240B29-F687-4F45-9708-019B960494DF}">
+              <a14:hiddenLine xmlns:a14="http://schemas.microsoft.com/office/drawing/2010/main" w="19050" algn="ctr">
+                <a:solidFill>
+                  <a:schemeClr val="tx2"/>
+                </a:solidFill>
+                <a:miter lim="800000"/>
+                <a:headEnd/>
+                <a:tailEnd/>
+              </a14:hiddenLine>
+            </a:ext>
+            <a:ext uri="{AF507438-7753-43E0-B8FC-AC1667EBCBE1}">
+              <a14:hiddenEffects xmlns:a14="http://schemas.microsoft.com/office/drawing/2010/main">
+                <a:effectLst>
+                  <a:outerShdw dist="35921" dir="2700000" algn="ctr" rotWithShape="0">
+                    <a:schemeClr val="bg2"/>
+                  </a:outerShdw>
+                </a:effectLst>
+              </a14:hiddenEffects>
+            </a:ext>
+          </a:extLst>
+        </p:spPr>
+        <p:txBody>
+          <a:bodyPr lIns="0" tIns="0" rIns="0" bIns="0" anchor="ctr"/>
+          <a:lstStyle>
+            <a:lvl1pPr marL="376238" algn="l">
+              <a:defRPr sz="2400">
+                <a:solidFill>
+                  <a:schemeClr val="tx1"/>
+                </a:solidFill>
+                <a:latin typeface="Arial" charset="0"/>
+              </a:defRPr>
+            </a:lvl1pPr>
+            <a:lvl2pPr marL="566738" algn="l">
+              <a:defRPr sz="2400">
+                <a:solidFill>
+                  <a:schemeClr val="tx1"/>
+                </a:solidFill>
+                <a:latin typeface="Arial" charset="0"/>
+              </a:defRPr>
+            </a:lvl2pPr>
+            <a:lvl3pPr algn="l">
+              <a:defRPr sz="2400">
+                <a:solidFill>
+                  <a:schemeClr val="tx1"/>
+                </a:solidFill>
+                <a:latin typeface="Arial" charset="0"/>
+              </a:defRPr>
+            </a:lvl3pPr>
+            <a:lvl4pPr algn="l">
+              <a:defRPr sz="2400">
+                <a:solidFill>
+                  <a:schemeClr val="tx1"/>
+                </a:solidFill>
+                <a:latin typeface="Arial" charset="0"/>
+              </a:defRPr>
+            </a:lvl4pPr>
+            <a:lvl5pPr algn="l">
+              <a:defRPr sz="2400">
+                <a:solidFill>
+                  <a:schemeClr val="tx1"/>
+                </a:solidFill>
+                <a:latin typeface="Arial" charset="0"/>
+              </a:defRPr>
+            </a:lvl5pPr>
+            <a:lvl6pPr eaLnBrk="0" fontAlgn="base" hangingPunct="0">
+              <a:spcBef>
+                <a:spcPct val="0"/>
+              </a:spcBef>
+              <a:spcAft>
+                <a:spcPct val="0"/>
+              </a:spcAft>
+              <a:defRPr sz="2400">
+                <a:solidFill>
+                  <a:schemeClr val="tx1"/>
+                </a:solidFill>
+                <a:latin typeface="Arial" charset="0"/>
+              </a:defRPr>
+            </a:lvl6pPr>
+            <a:lvl7pPr eaLnBrk="0" fontAlgn="base" hangingPunct="0">
+              <a:spcBef>
+                <a:spcPct val="0"/>
+              </a:spcBef>
+              <a:spcAft>
+                <a:spcPct val="0"/>
+              </a:spcAft>
+              <a:defRPr sz="2400">
+                <a:solidFill>
+                  <a:schemeClr val="tx1"/>
+                </a:solidFill>
+                <a:latin typeface="Arial" charset="0"/>
+              </a:defRPr>
+            </a:lvl7pPr>
+            <a:lvl8pPr eaLnBrk="0" fontAlgn="base" hangingPunct="0">
+              <a:spcBef>
+                <a:spcPct val="0"/>
+              </a:spcBef>
+              <a:spcAft>
+                <a:spcPct val="0"/>
+              </a:spcAft>
+              <a:defRPr sz="2400">
+                <a:solidFill>
+                  <a:schemeClr val="tx1"/>
+                </a:solidFill>
+                <a:latin typeface="Arial" charset="0"/>
+              </a:defRPr>
+            </a:lvl8pPr>
+            <a:lvl9pPr eaLnBrk="0" fontAlgn="base" hangingPunct="0">
+              <a:spcBef>
+                <a:spcPct val="0"/>
+              </a:spcBef>
+              <a:spcAft>
+                <a:spcPct val="0"/>
+              </a:spcAft>
+              <a:defRPr sz="2400">
+                <a:solidFill>
+                  <a:schemeClr val="tx1"/>
+                </a:solidFill>
+                <a:latin typeface="Arial" charset="0"/>
+              </a:defRPr>
+            </a:lvl9pPr>
+          </a:lstStyle>
+          <a:p>
+            <a:pPr eaLnBrk="1" hangingPunct="1">
+              <a:spcBef>
+                <a:spcPct val="30000"/>
+              </a:spcBef>
+            </a:pPr>
+            <a:r>
+              <a:rPr lang="de-DE" altLang="de-DE" sz="1300" b="1" dirty="0">
+                <a:solidFill>
+                  <a:srgbClr val="000000"/>
+                </a:solidFill>
+              </a:rPr>
+              <a:t>BILD</a:t>
+            </a:r>
+          </a:p>
+          <a:p>
+            <a:pPr eaLnBrk="1" hangingPunct="1">
+              <a:spcBef>
+                <a:spcPct val="30000"/>
+              </a:spcBef>
+            </a:pPr>
+            <a:r>
+              <a:rPr lang="de-DE" altLang="de-DE" sz="1300" dirty="0">
+                <a:solidFill>
+                  <a:srgbClr val="000000"/>
+                </a:solidFill>
+              </a:rPr>
+              <a:t>Positionierungsfläche für Bilder.</a:t>
+            </a:r>
+          </a:p>
+          <a:p>
+            <a:pPr eaLnBrk="1" hangingPunct="1">
+              <a:spcBef>
+                <a:spcPct val="30000"/>
+              </a:spcBef>
+            </a:pPr>
+            <a:r>
+              <a:rPr lang="de-DE" altLang="de-DE" sz="1300" dirty="0">
+                <a:solidFill>
+                  <a:srgbClr val="000000"/>
+                </a:solidFill>
+              </a:rPr>
+              <a:t>Bitte in linker oberer Ecke beginnen.</a:t>
+            </a:r>
+          </a:p>
+          <a:p>
+            <a:pPr eaLnBrk="1" hangingPunct="1">
+              <a:spcBef>
+                <a:spcPct val="30000"/>
+              </a:spcBef>
+            </a:pPr>
+            <a:r>
+              <a:rPr lang="de-DE" altLang="de-DE" sz="1300" dirty="0">
+                <a:solidFill>
+                  <a:srgbClr val="000000"/>
+                </a:solidFill>
+              </a:rPr>
+              <a:t>Bis maximal rechte und/oder untere Begrenzung, ggf. Bild beschneiden.</a:t>
             </a:r>
           </a:p>
         </p:txBody>
@@ -4820,7 +6027,7 @@
     </p:spTree>
     <p:extLst>
       <p:ext uri="{BB962C8B-B14F-4D97-AF65-F5344CB8AC3E}">
-        <p14:creationId xmlns:p14="http://schemas.microsoft.com/office/powerpoint/2010/main" val="2417463584"/>
+        <p14:creationId xmlns:p14="http://schemas.microsoft.com/office/powerpoint/2010/main" val="4041793622"/>
       </p:ext>
     </p:extLst>
   </p:cSld>
@@ -4890,6 +6097,258 @@
               <a:rPr lang="de-DE" smtClean="0"/>
               <a:pPr/>
               <a:t>13</a:t>
+            </a:fld>
+            <a:endParaRPr lang="de-DE" dirty="0"/>
+          </a:p>
+        </p:txBody>
+      </p:sp>
+      <p:graphicFrame>
+        <p:nvGraphicFramePr>
+          <p:cNvPr id="5" name="Object 2"/>
+          <p:cNvGraphicFramePr>
+            <a:graphicFrameLocks noChangeAspect="1"/>
+          </p:cNvGraphicFramePr>
+          <p:nvPr/>
+        </p:nvGraphicFramePr>
+        <p:xfrm>
+          <a:off x="-211487" y="1817566"/>
+          <a:ext cx="8063654" cy="4631092"/>
+        </p:xfrm>
+        <a:graphic>
+          <a:graphicData uri="http://schemas.openxmlformats.org/drawingml/2006/chart">
+            <c:chart xmlns:c="http://schemas.openxmlformats.org/drawingml/2006/chart" xmlns:r="http://schemas.openxmlformats.org/officeDocument/2006/relationships" r:id="rId2"/>
+          </a:graphicData>
+        </a:graphic>
+      </p:graphicFrame>
+      <p:sp>
+        <p:nvSpPr>
+          <p:cNvPr id="6" name="Rectangle 3"/>
+          <p:cNvSpPr>
+            <a:spLocks noGrp="1" noChangeArrowheads="1"/>
+          </p:cNvSpPr>
+          <p:nvPr>
+            <p:ph type="title"/>
+          </p:nvPr>
+        </p:nvSpPr>
+        <p:spPr>
+          <a:xfrm>
+            <a:off x="971550" y="1404000"/>
+            <a:ext cx="7704138" cy="792162"/>
+          </a:xfrm>
+        </p:spPr>
+        <p:txBody>
+          <a:bodyPr/>
+          <a:lstStyle/>
+          <a:p>
+            <a:r>
+              <a:rPr lang="de-DE" altLang="de-DE" dirty="0"/>
+              <a:t>Überschrift Balkendiagramm</a:t>
+            </a:r>
+          </a:p>
+        </p:txBody>
+      </p:sp>
+    </p:spTree>
+    <p:extLst>
+      <p:ext uri="{BB962C8B-B14F-4D97-AF65-F5344CB8AC3E}">
+        <p14:creationId xmlns:p14="http://schemas.microsoft.com/office/powerpoint/2010/main" val="301614500"/>
+      </p:ext>
+    </p:extLst>
+  </p:cSld>
+  <p:clrMapOvr>
+    <a:masterClrMapping/>
+  </p:clrMapOvr>
+  <p:transition/>
+</p:sld>
+</file>
+
+<file path=ppt/slides/slide14.xml><?xml version="1.0" encoding="utf-8"?>
+<p:sld xmlns:a="http://schemas.openxmlformats.org/drawingml/2006/main" xmlns:r="http://schemas.openxmlformats.org/officeDocument/2006/relationships" xmlns:p="http://schemas.openxmlformats.org/presentationml/2006/main">
+  <p:cSld>
+    <p:spTree>
+      <p:nvGrpSpPr>
+        <p:cNvPr id="1" name=""/>
+        <p:cNvGrpSpPr/>
+        <p:nvPr/>
+      </p:nvGrpSpPr>
+      <p:grpSpPr>
+        <a:xfrm>
+          <a:off x="0" y="0"/>
+          <a:ext cx="0" cy="0"/>
+          <a:chOff x="0" y="0"/>
+          <a:chExt cx="0" cy="0"/>
+        </a:xfrm>
+      </p:grpSpPr>
+      <p:sp>
+        <p:nvSpPr>
+          <p:cNvPr id="3" name="Fußzeilenplatzhalter 2"/>
+          <p:cNvSpPr>
+            <a:spLocks noGrp="1"/>
+          </p:cNvSpPr>
+          <p:nvPr>
+            <p:ph type="ftr" sz="quarter" idx="10"/>
+          </p:nvPr>
+        </p:nvSpPr>
+        <p:spPr/>
+        <p:txBody>
+          <a:bodyPr/>
+          <a:lstStyle/>
+          <a:p>
+            <a:r>
+              <a:rPr lang="en-US" altLang="de-DE"/>
+              <a:t>Hochschule Mannheim University of Applied Sciences | Vorname Name</a:t>
+            </a:r>
+            <a:endParaRPr lang="de-DE" altLang="de-DE" dirty="0"/>
+          </a:p>
+        </p:txBody>
+      </p:sp>
+      <p:sp>
+        <p:nvSpPr>
+          <p:cNvPr id="4" name="Foliennummernplatzhalter 3"/>
+          <p:cNvSpPr>
+            <a:spLocks noGrp="1"/>
+          </p:cNvSpPr>
+          <p:nvPr>
+            <p:ph type="sldNum" sz="quarter" idx="11"/>
+          </p:nvPr>
+        </p:nvSpPr>
+        <p:spPr/>
+        <p:txBody>
+          <a:bodyPr/>
+          <a:lstStyle/>
+          <a:p>
+            <a:fld id="{57D12BB6-0ED4-46B6-AB23-7758AD07EFBF}" type="slidenum">
+              <a:rPr lang="de-DE" smtClean="0"/>
+              <a:pPr/>
+              <a:t>14</a:t>
+            </a:fld>
+            <a:endParaRPr lang="de-DE" dirty="0"/>
+          </a:p>
+        </p:txBody>
+      </p:sp>
+      <p:graphicFrame>
+        <p:nvGraphicFramePr>
+          <p:cNvPr id="5" name="Object 2"/>
+          <p:cNvGraphicFramePr>
+            <a:graphicFrameLocks noChangeAspect="1"/>
+          </p:cNvGraphicFramePr>
+          <p:nvPr>
+            <p:extLst>
+              <p:ext uri="{D42A27DB-BD31-4B8C-83A1-F6EECF244321}">
+                <p14:modId xmlns:p14="http://schemas.microsoft.com/office/powerpoint/2010/main" val="2216884294"/>
+              </p:ext>
+            </p:extLst>
+          </p:nvPr>
+        </p:nvGraphicFramePr>
+        <p:xfrm>
+          <a:off x="467544" y="2132856"/>
+          <a:ext cx="5974486" cy="3778785"/>
+        </p:xfrm>
+        <a:graphic>
+          <a:graphicData uri="http://schemas.openxmlformats.org/drawingml/2006/chart">
+            <c:chart xmlns:c="http://schemas.openxmlformats.org/drawingml/2006/chart" xmlns:r="http://schemas.openxmlformats.org/officeDocument/2006/relationships" r:id="rId2"/>
+          </a:graphicData>
+        </a:graphic>
+      </p:graphicFrame>
+      <p:sp>
+        <p:nvSpPr>
+          <p:cNvPr id="6" name="Rectangle 3"/>
+          <p:cNvSpPr>
+            <a:spLocks noGrp="1" noChangeArrowheads="1"/>
+          </p:cNvSpPr>
+          <p:nvPr>
+            <p:ph type="title"/>
+          </p:nvPr>
+        </p:nvSpPr>
+        <p:spPr>
+          <a:xfrm>
+            <a:off x="971550" y="1404000"/>
+            <a:ext cx="7704138" cy="792162"/>
+          </a:xfrm>
+        </p:spPr>
+        <p:txBody>
+          <a:bodyPr/>
+          <a:lstStyle/>
+          <a:p>
+            <a:r>
+              <a:rPr lang="de-DE" altLang="de-DE" dirty="0"/>
+              <a:t>Überschrift Tortendiagramm</a:t>
+            </a:r>
+          </a:p>
+        </p:txBody>
+      </p:sp>
+    </p:spTree>
+    <p:extLst>
+      <p:ext uri="{BB962C8B-B14F-4D97-AF65-F5344CB8AC3E}">
+        <p14:creationId xmlns:p14="http://schemas.microsoft.com/office/powerpoint/2010/main" val="2417463584"/>
+      </p:ext>
+    </p:extLst>
+  </p:cSld>
+  <p:clrMapOvr>
+    <a:masterClrMapping/>
+  </p:clrMapOvr>
+  <p:transition/>
+</p:sld>
+</file>
+
+<file path=ppt/slides/slide15.xml><?xml version="1.0" encoding="utf-8"?>
+<p:sld xmlns:a="http://schemas.openxmlformats.org/drawingml/2006/main" xmlns:r="http://schemas.openxmlformats.org/officeDocument/2006/relationships" xmlns:p="http://schemas.openxmlformats.org/presentationml/2006/main">
+  <p:cSld>
+    <p:spTree>
+      <p:nvGrpSpPr>
+        <p:cNvPr id="1" name=""/>
+        <p:cNvGrpSpPr/>
+        <p:nvPr/>
+      </p:nvGrpSpPr>
+      <p:grpSpPr>
+        <a:xfrm>
+          <a:off x="0" y="0"/>
+          <a:ext cx="0" cy="0"/>
+          <a:chOff x="0" y="0"/>
+          <a:chExt cx="0" cy="0"/>
+        </a:xfrm>
+      </p:grpSpPr>
+      <p:sp>
+        <p:nvSpPr>
+          <p:cNvPr id="3" name="Fußzeilenplatzhalter 2"/>
+          <p:cNvSpPr>
+            <a:spLocks noGrp="1"/>
+          </p:cNvSpPr>
+          <p:nvPr>
+            <p:ph type="ftr" sz="quarter" idx="10"/>
+          </p:nvPr>
+        </p:nvSpPr>
+        <p:spPr/>
+        <p:txBody>
+          <a:bodyPr/>
+          <a:lstStyle/>
+          <a:p>
+            <a:r>
+              <a:rPr lang="en-US" altLang="de-DE"/>
+              <a:t>Hochschule Mannheim University of Applied Sciences | Vorname Name</a:t>
+            </a:r>
+            <a:endParaRPr lang="de-DE" altLang="de-DE" dirty="0"/>
+          </a:p>
+        </p:txBody>
+      </p:sp>
+      <p:sp>
+        <p:nvSpPr>
+          <p:cNvPr id="4" name="Foliennummernplatzhalter 3"/>
+          <p:cNvSpPr>
+            <a:spLocks noGrp="1"/>
+          </p:cNvSpPr>
+          <p:nvPr>
+            <p:ph type="sldNum" sz="quarter" idx="11"/>
+          </p:nvPr>
+        </p:nvSpPr>
+        <p:spPr/>
+        <p:txBody>
+          <a:bodyPr/>
+          <a:lstStyle/>
+          <a:p>
+            <a:fld id="{57D12BB6-0ED4-46B6-AB23-7758AD07EFBF}" type="slidenum">
+              <a:rPr lang="de-DE" smtClean="0"/>
+              <a:pPr/>
+              <a:t>15</a:t>
             </a:fld>
             <a:endParaRPr lang="de-DE" dirty="0"/>
           </a:p>
@@ -9483,7 +10942,7 @@
 </p:sld>
 </file>
 
-<file path=ppt/slides/slide14.xml><?xml version="1.0" encoding="utf-8"?>
+<file path=ppt/slides/slide16.xml><?xml version="1.0" encoding="utf-8"?>
 <p:sld xmlns:a="http://schemas.openxmlformats.org/drawingml/2006/main" xmlns:r="http://schemas.openxmlformats.org/officeDocument/2006/relationships" xmlns:p="http://schemas.openxmlformats.org/presentationml/2006/main">
   <p:cSld>
     <p:spTree>
@@ -9541,7 +11000,7 @@
             <a:fld id="{57D12BB6-0ED4-46B6-AB23-7758AD07EFBF}" type="slidenum">
               <a:rPr lang="de-DE" smtClean="0"/>
               <a:pPr/>
-              <a:t>14</a:t>
+              <a:t>16</a:t>
             </a:fld>
             <a:endParaRPr lang="de-DE" dirty="0"/>
           </a:p>
@@ -10756,7 +12215,7 @@
 </p:sld>
 </file>
 
-<file path=ppt/slides/slide15.xml><?xml version="1.0" encoding="utf-8"?>
+<file path=ppt/slides/slide17.xml><?xml version="1.0" encoding="utf-8"?>
 <p:sld xmlns:a="http://schemas.openxmlformats.org/drawingml/2006/main" xmlns:r="http://schemas.openxmlformats.org/officeDocument/2006/relationships" xmlns:p="http://schemas.openxmlformats.org/presentationml/2006/main">
   <p:cSld>
     <p:spTree>
@@ -10814,7 +12273,7 @@
             <a:fld id="{57D12BB6-0ED4-46B6-AB23-7758AD07EFBF}" type="slidenum">
               <a:rPr lang="de-DE" smtClean="0"/>
               <a:pPr/>
-              <a:t>15</a:t>
+              <a:t>17</a:t>
             </a:fld>
             <a:endParaRPr lang="de-DE" dirty="0"/>
           </a:p>
@@ -12626,7 +14085,7 @@
 </p:sld>
 </file>
 
-<file path=ppt/slides/slide16.xml><?xml version="1.0" encoding="utf-8"?>
+<file path=ppt/slides/slide18.xml><?xml version="1.0" encoding="utf-8"?>
 <p:sld xmlns:a="http://schemas.openxmlformats.org/drawingml/2006/main" xmlns:r="http://schemas.openxmlformats.org/officeDocument/2006/relationships" xmlns:p="http://schemas.openxmlformats.org/presentationml/2006/main">
   <p:cSld>
     <p:spTree>
@@ -12684,7 +14143,7 @@
             <a:fld id="{57D12BB6-0ED4-46B6-AB23-7758AD07EFBF}" type="slidenum">
               <a:rPr lang="de-DE" smtClean="0"/>
               <a:pPr/>
-              <a:t>16</a:t>
+              <a:t>18</a:t>
             </a:fld>
             <a:endParaRPr lang="de-DE" dirty="0"/>
           </a:p>
@@ -17883,13 +19342,138 @@
           <a:p>
             <a:pPr lvl="1"/>
             <a:r>
-              <a:rPr lang="de-DE" altLang="de-DE" kern="0" dirty="0" err="1"/>
-              <a:t>asdf</a:t>
+              <a:rPr lang="en-US" altLang="de-DE" kern="0" dirty="0"/>
+              <a:t>2</a:t>
             </a:r>
-            <a:endParaRPr lang="de-DE" altLang="de-DE" kern="0" dirty="0"/>
+            <a:r>
+              <a:rPr lang="de-DE" altLang="de-DE" kern="0" dirty="0"/>
+              <a:t> Klassen</a:t>
+            </a:r>
           </a:p>
           <a:p>
-            <a:pPr lvl="1"/>
+            <a:pPr lvl="2"/>
+            <a:r>
+              <a:rPr lang="en-US" altLang="de-DE" kern="0" dirty="0" err="1"/>
+              <a:t>Zeitsignal</a:t>
+            </a:r>
+            <a:r>
+              <a:rPr lang="en-US" altLang="de-DE" kern="0" dirty="0"/>
+              <a:t> </a:t>
+            </a:r>
+            <a:r>
+              <a:rPr lang="en-US" altLang="de-DE" kern="0" dirty="0" err="1"/>
+              <a:t>Verarbeitung</a:t>
+            </a:r>
+            <a:endParaRPr lang="en-US" altLang="de-DE" kern="0" dirty="0"/>
+          </a:p>
+          <a:p>
+            <a:pPr lvl="3"/>
+            <a:r>
+              <a:rPr lang="en-US" altLang="de-DE" kern="0" dirty="0" err="1"/>
+              <a:t>Generierung</a:t>
+            </a:r>
+            <a:r>
+              <a:rPr lang="en-US" altLang="de-DE" kern="0" dirty="0"/>
+              <a:t> des Histograms</a:t>
+            </a:r>
+          </a:p>
+          <a:p>
+            <a:pPr lvl="3"/>
+            <a:r>
+              <a:rPr lang="en-US" altLang="de-DE" kern="0" dirty="0" err="1"/>
+              <a:t>Extraktion</a:t>
+            </a:r>
+            <a:r>
+              <a:rPr lang="en-US" altLang="de-DE" kern="0" dirty="0"/>
+              <a:t> der features</a:t>
+            </a:r>
+          </a:p>
+          <a:p>
+            <a:pPr lvl="2"/>
+            <a:r>
+              <a:rPr lang="en-US" altLang="de-DE" kern="0" dirty="0" err="1"/>
+              <a:t>Klassifizierung</a:t>
+            </a:r>
+            <a:endParaRPr lang="en-US" altLang="de-DE" kern="0" dirty="0"/>
+          </a:p>
+          <a:p>
+            <a:pPr lvl="3"/>
+            <a:r>
+              <a:rPr lang="en-US" altLang="de-DE" kern="0" dirty="0"/>
+              <a:t>FFN</a:t>
+            </a:r>
+          </a:p>
+          <a:p>
+            <a:pPr lvl="3"/>
+            <a:r>
+              <a:rPr lang="en-US" altLang="de-DE" kern="0" dirty="0"/>
+              <a:t>2 </a:t>
+            </a:r>
+            <a:r>
+              <a:rPr lang="en-US" altLang="de-DE" kern="0" dirty="0" err="1"/>
+              <a:t>Klasse</a:t>
+            </a:r>
+            <a:r>
+              <a:rPr lang="en-US" altLang="de-DE" kern="0" dirty="0"/>
+              <a:t>: </a:t>
+            </a:r>
+            <a:r>
+              <a:rPr lang="en-US" altLang="de-DE" kern="0" dirty="0" err="1"/>
+              <a:t>Apnoe</a:t>
+            </a:r>
+            <a:r>
+              <a:rPr lang="en-US" altLang="de-DE" kern="0" dirty="0"/>
+              <a:t> und </a:t>
+            </a:r>
+            <a:r>
+              <a:rPr lang="en-US" altLang="de-DE" kern="0" dirty="0" err="1"/>
+              <a:t>kein</a:t>
+            </a:r>
+            <a:r>
+              <a:rPr lang="en-US" altLang="de-DE" kern="0" dirty="0"/>
+              <a:t> </a:t>
+            </a:r>
+            <a:r>
+              <a:rPr lang="en-US" altLang="de-DE" kern="0" dirty="0" err="1"/>
+              <a:t>Apnoe</a:t>
+            </a:r>
+            <a:endParaRPr lang="en-US" altLang="de-DE" kern="0" dirty="0"/>
+          </a:p>
+          <a:p>
+            <a:pPr lvl="3"/>
+            <a:r>
+              <a:rPr lang="en-US" altLang="de-DE" kern="0" dirty="0"/>
+              <a:t>Input 26 </a:t>
+            </a:r>
+            <a:r>
+              <a:rPr lang="en-US" altLang="de-DE" kern="0" dirty="0" err="1"/>
+              <a:t>Werte</a:t>
+            </a:r>
+            <a:r>
+              <a:rPr lang="en-US" altLang="de-DE" kern="0" dirty="0"/>
+              <a:t> ( </a:t>
+            </a:r>
+            <a:r>
+              <a:rPr lang="en-US" altLang="de-DE" kern="0" dirty="0" err="1"/>
+              <a:t>max_values</a:t>
+            </a:r>
+            <a:r>
+              <a:rPr lang="en-US" altLang="de-DE" kern="0" dirty="0"/>
+              <a:t> </a:t>
+            </a:r>
+            <a:r>
+              <a:rPr lang="en-US" altLang="de-DE" kern="0" dirty="0" err="1"/>
+              <a:t>indeces</a:t>
+            </a:r>
+            <a:r>
+              <a:rPr lang="en-US" altLang="de-DE" kern="0" dirty="0"/>
+              <a:t> )</a:t>
+            </a:r>
+          </a:p>
+          <a:p>
+            <a:pPr marL="1588" lvl="1" indent="0">
+              <a:buNone/>
+            </a:pPr>
             <a:endParaRPr lang="de-DE" altLang="de-DE" kern="0" dirty="0"/>
           </a:p>
         </p:txBody>
@@ -17994,7 +19578,7 @@
           <a:p>
             <a:r>
               <a:rPr lang="de-DE" altLang="de-DE" dirty="0"/>
-              <a:t>5. Fazit</a:t>
+              <a:t>4. Modulbeschreibung</a:t>
             </a:r>
           </a:p>
         </p:txBody>
@@ -18194,8 +19778,20 @@
           <a:p>
             <a:pPr lvl="1"/>
             <a:r>
-              <a:rPr lang="de-DE" altLang="de-DE" kern="0" dirty="0" err="1"/>
-              <a:t>asdf</a:t>
+              <a:rPr lang="de-DE" altLang="de-DE" kern="0" dirty="0"/>
+              <a:t>Zeitsignal Vorverarbeitung</a:t>
+            </a:r>
+            <a:r>
+              <a:rPr lang="en-US" altLang="de-DE" kern="0" dirty="0"/>
+              <a:t> (</a:t>
+            </a:r>
+            <a:r>
+              <a:rPr lang="en-US" altLang="de-DE" kern="0" dirty="0" err="1"/>
+              <a:t>ECGProcessing.m</a:t>
+            </a:r>
+            <a:r>
+              <a:rPr lang="en-US" altLang="de-DE" kern="0" dirty="0"/>
+              <a:t>)</a:t>
             </a:r>
             <a:endParaRPr lang="de-DE" altLang="de-DE" kern="0" dirty="0"/>
           </a:p>
@@ -18205,10 +19801,542 @@
           </a:p>
         </p:txBody>
       </p:sp>
+      <p:sp>
+        <p:nvSpPr>
+          <p:cNvPr id="2" name="Rechteck: abgerundete Ecken 1">
+            <a:extLst>
+              <a:ext uri="{FF2B5EF4-FFF2-40B4-BE49-F238E27FC236}">
+                <a16:creationId xmlns:a16="http://schemas.microsoft.com/office/drawing/2014/main" id="{415963FE-2173-42A4-A281-8C6EAFBC82CD}"/>
+              </a:ext>
+            </a:extLst>
+          </p:cNvPr>
+          <p:cNvSpPr/>
+          <p:nvPr/>
+        </p:nvSpPr>
+        <p:spPr bwMode="auto">
+          <a:xfrm>
+            <a:off x="1547664" y="2985737"/>
+            <a:ext cx="6192688" cy="360040"/>
+          </a:xfrm>
+          <a:prstGeom prst="roundRect">
+            <a:avLst/>
+          </a:prstGeom>
+          <a:noFill/>
+          <a:ln w="19050" cap="flat" cmpd="sng" algn="ctr">
+            <a:solidFill>
+              <a:schemeClr val="hlink"/>
+            </a:solidFill>
+            <a:prstDash val="solid"/>
+            <a:round/>
+            <a:headEnd type="none" w="med" len="med"/>
+            <a:tailEnd type="none" w="med" len="med"/>
+          </a:ln>
+          <a:effectLst/>
+          <a:extLst>
+            <a:ext uri="{909E8E84-426E-40DD-AFC4-6F175D3DCCD1}">
+              <a14:hiddenFill xmlns:a14="http://schemas.microsoft.com/office/drawing/2010/main">
+                <a:solidFill>
+                  <a:schemeClr val="tx2"/>
+                </a:solidFill>
+              </a14:hiddenFill>
+            </a:ext>
+            <a:ext uri="{AF507438-7753-43E0-B8FC-AC1667EBCBE1}">
+              <a14:hiddenEffects xmlns:a14="http://schemas.microsoft.com/office/drawing/2010/main">
+                <a:effectLst>
+                  <a:outerShdw dist="35921" dir="2700000" algn="ctr" rotWithShape="0">
+                    <a:schemeClr val="bg2"/>
+                  </a:outerShdw>
+                </a:effectLst>
+              </a14:hiddenEffects>
+            </a:ext>
+          </a:extLst>
+        </p:spPr>
+        <p:txBody>
+          <a:bodyPr vert="horz" wrap="square" lIns="90000" tIns="46800" rIns="90000" bIns="46800" numCol="1" rtlCol="0" anchor="ctr" anchorCtr="0" compatLnSpc="1">
+            <a:prstTxWarp prst="textNoShape">
+              <a:avLst/>
+            </a:prstTxWarp>
+          </a:bodyPr>
+          <a:lstStyle/>
+          <a:p>
+            <a:pPr marL="0" marR="0" indent="0" algn="ctr" defTabSz="914400" rtl="0" eaLnBrk="0" fontAlgn="base" latinLnBrk="0" hangingPunct="0">
+              <a:lnSpc>
+                <a:spcPct val="100000"/>
+              </a:lnSpc>
+              <a:spcBef>
+                <a:spcPct val="0"/>
+              </a:spcBef>
+              <a:spcAft>
+                <a:spcPct val="0"/>
+              </a:spcAft>
+              <a:buClrTx/>
+              <a:buSzTx/>
+              <a:buFontTx/>
+              <a:buNone/>
+              <a:tabLst/>
+            </a:pPr>
+            <a:r>
+              <a:rPr kumimoji="0" lang="en-US" sz="1800" b="0" i="0" u="none" strike="noStrike" cap="none" normalizeH="0" baseline="0" dirty="0" err="1">
+                <a:ln>
+                  <a:noFill/>
+                </a:ln>
+                <a:solidFill>
+                  <a:schemeClr val="tx1"/>
+                </a:solidFill>
+                <a:effectLst/>
+                <a:latin typeface="Arial" charset="0"/>
+              </a:rPr>
+              <a:t>input_vector</a:t>
+            </a:r>
+            <a:r>
+              <a:rPr kumimoji="0" lang="en-US" sz="1800" b="0" i="0" u="none" strike="noStrike" cap="none" normalizeH="0" baseline="0" dirty="0">
+                <a:ln>
+                  <a:noFill/>
+                </a:ln>
+                <a:solidFill>
+                  <a:schemeClr val="tx1"/>
+                </a:solidFill>
+                <a:effectLst/>
+                <a:latin typeface="Arial" charset="0"/>
+              </a:rPr>
+              <a:t> = </a:t>
+            </a:r>
+            <a:r>
+              <a:rPr kumimoji="0" lang="en-US" sz="1800" b="0" i="0" u="none" strike="noStrike" cap="none" normalizeH="0" baseline="0" dirty="0" err="1">
+                <a:ln>
+                  <a:noFill/>
+                </a:ln>
+                <a:solidFill>
+                  <a:schemeClr val="tx1"/>
+                </a:solidFill>
+                <a:effectLst/>
+                <a:latin typeface="Arial" charset="0"/>
+              </a:rPr>
+              <a:t>generate_input_vector</a:t>
+            </a:r>
+            <a:r>
+              <a:rPr lang="en-US" dirty="0"/>
+              <a:t> ( </a:t>
+            </a:r>
+            <a:r>
+              <a:rPr lang="en-US" dirty="0" err="1"/>
+              <a:t>ecg_chunk</a:t>
+            </a:r>
+            <a:r>
+              <a:rPr lang="en-US" dirty="0"/>
+              <a:t> )</a:t>
+            </a:r>
+            <a:endParaRPr kumimoji="0" lang="de-DE" sz="1800" b="0" i="0" u="none" strike="noStrike" cap="none" normalizeH="0" baseline="0" dirty="0">
+              <a:ln>
+                <a:noFill/>
+              </a:ln>
+              <a:solidFill>
+                <a:schemeClr val="tx1"/>
+              </a:solidFill>
+              <a:effectLst/>
+              <a:latin typeface="Arial" charset="0"/>
+            </a:endParaRPr>
+          </a:p>
+        </p:txBody>
+      </p:sp>
+      <p:sp>
+        <p:nvSpPr>
+          <p:cNvPr id="8" name="Rechteck: abgerundete Ecken 7">
+            <a:extLst>
+              <a:ext uri="{FF2B5EF4-FFF2-40B4-BE49-F238E27FC236}">
+                <a16:creationId xmlns:a16="http://schemas.microsoft.com/office/drawing/2014/main" id="{4EF7CDE5-10A9-49EB-97DB-69C2795086DC}"/>
+              </a:ext>
+            </a:extLst>
+          </p:cNvPr>
+          <p:cNvSpPr/>
+          <p:nvPr/>
+        </p:nvSpPr>
+        <p:spPr bwMode="auto">
+          <a:xfrm>
+            <a:off x="1547664" y="4101777"/>
+            <a:ext cx="6192688" cy="360040"/>
+          </a:xfrm>
+          <a:prstGeom prst="roundRect">
+            <a:avLst/>
+          </a:prstGeom>
+          <a:noFill/>
+          <a:ln w="19050" cap="flat" cmpd="sng" algn="ctr">
+            <a:solidFill>
+              <a:schemeClr val="hlink"/>
+            </a:solidFill>
+            <a:prstDash val="solid"/>
+            <a:round/>
+            <a:headEnd type="none" w="med" len="med"/>
+            <a:tailEnd type="none" w="med" len="med"/>
+          </a:ln>
+          <a:effectLst/>
+          <a:extLst>
+            <a:ext uri="{909E8E84-426E-40DD-AFC4-6F175D3DCCD1}">
+              <a14:hiddenFill xmlns:a14="http://schemas.microsoft.com/office/drawing/2010/main">
+                <a:solidFill>
+                  <a:schemeClr val="tx2"/>
+                </a:solidFill>
+              </a14:hiddenFill>
+            </a:ext>
+            <a:ext uri="{AF507438-7753-43E0-B8FC-AC1667EBCBE1}">
+              <a14:hiddenEffects xmlns:a14="http://schemas.microsoft.com/office/drawing/2010/main">
+                <a:effectLst>
+                  <a:outerShdw dist="35921" dir="2700000" algn="ctr" rotWithShape="0">
+                    <a:schemeClr val="bg2"/>
+                  </a:outerShdw>
+                </a:effectLst>
+              </a14:hiddenEffects>
+            </a:ext>
+          </a:extLst>
+        </p:spPr>
+        <p:txBody>
+          <a:bodyPr vert="horz" wrap="square" lIns="90000" tIns="46800" rIns="90000" bIns="46800" numCol="1" rtlCol="0" anchor="ctr" anchorCtr="0" compatLnSpc="1">
+            <a:prstTxWarp prst="textNoShape">
+              <a:avLst/>
+            </a:prstTxWarp>
+          </a:bodyPr>
+          <a:lstStyle/>
+          <a:p>
+            <a:pPr marL="0" marR="0" indent="0" algn="ctr" defTabSz="914400" rtl="0" eaLnBrk="0" fontAlgn="base" latinLnBrk="0" hangingPunct="0">
+              <a:lnSpc>
+                <a:spcPct val="100000"/>
+              </a:lnSpc>
+              <a:spcBef>
+                <a:spcPct val="0"/>
+              </a:spcBef>
+              <a:spcAft>
+                <a:spcPct val="0"/>
+              </a:spcAft>
+              <a:buClrTx/>
+              <a:buSzTx/>
+              <a:buFontTx/>
+              <a:buNone/>
+              <a:tabLst/>
+            </a:pPr>
+            <a:r>
+              <a:rPr lang="en-US" dirty="0"/>
+              <a:t>[</a:t>
+            </a:r>
+            <a:r>
+              <a:rPr lang="en-US" dirty="0" err="1"/>
+              <a:t>val</a:t>
+            </a:r>
+            <a:r>
+              <a:rPr lang="en-US" dirty="0"/>
+              <a:t>, </a:t>
+            </a:r>
+            <a:r>
+              <a:rPr lang="en-US" dirty="0" err="1"/>
+              <a:t>idx</a:t>
+            </a:r>
+            <a:r>
+              <a:rPr lang="en-US" dirty="0"/>
+              <a:t>] = </a:t>
+            </a:r>
+            <a:r>
+              <a:rPr kumimoji="0" lang="en-US" sz="1800" b="0" i="0" u="none" strike="noStrike" cap="none" normalizeH="0" baseline="0" dirty="0" err="1">
+                <a:ln>
+                  <a:noFill/>
+                </a:ln>
+                <a:solidFill>
+                  <a:schemeClr val="tx1"/>
+                </a:solidFill>
+                <a:effectLst/>
+                <a:latin typeface="Arial" charset="0"/>
+              </a:rPr>
+              <a:t>process_histogram</a:t>
+            </a:r>
+            <a:r>
+              <a:rPr kumimoji="0" lang="en-US" sz="1800" b="0" i="0" u="none" strike="noStrike" cap="none" normalizeH="0" baseline="0" dirty="0">
+                <a:ln>
+                  <a:noFill/>
+                </a:ln>
+                <a:solidFill>
+                  <a:schemeClr val="tx1"/>
+                </a:solidFill>
+                <a:effectLst/>
+                <a:latin typeface="Arial" charset="0"/>
+              </a:rPr>
+              <a:t> ( histogram )</a:t>
+            </a:r>
+            <a:endParaRPr kumimoji="0" lang="de-DE" sz="1800" b="0" i="0" u="none" strike="noStrike" cap="none" normalizeH="0" baseline="0" dirty="0">
+              <a:ln>
+                <a:noFill/>
+              </a:ln>
+              <a:solidFill>
+                <a:schemeClr val="tx1"/>
+              </a:solidFill>
+              <a:effectLst/>
+              <a:latin typeface="Arial" charset="0"/>
+            </a:endParaRPr>
+          </a:p>
+        </p:txBody>
+      </p:sp>
+      <p:sp>
+        <p:nvSpPr>
+          <p:cNvPr id="10" name="Rechteck: abgerundete Ecken 9">
+            <a:extLst>
+              <a:ext uri="{FF2B5EF4-FFF2-40B4-BE49-F238E27FC236}">
+                <a16:creationId xmlns:a16="http://schemas.microsoft.com/office/drawing/2014/main" id="{449764E5-D0DB-4AED-A64D-5DB3104ACC90}"/>
+              </a:ext>
+            </a:extLst>
+          </p:cNvPr>
+          <p:cNvSpPr/>
+          <p:nvPr/>
+        </p:nvSpPr>
+        <p:spPr bwMode="auto">
+          <a:xfrm>
+            <a:off x="1547664" y="5248212"/>
+            <a:ext cx="6192688" cy="360040"/>
+          </a:xfrm>
+          <a:prstGeom prst="roundRect">
+            <a:avLst/>
+          </a:prstGeom>
+          <a:noFill/>
+          <a:ln w="19050" cap="flat" cmpd="sng" algn="ctr">
+            <a:solidFill>
+              <a:schemeClr val="hlink"/>
+            </a:solidFill>
+            <a:prstDash val="solid"/>
+            <a:round/>
+            <a:headEnd type="none" w="med" len="med"/>
+            <a:tailEnd type="none" w="med" len="med"/>
+          </a:ln>
+          <a:effectLst/>
+          <a:extLst>
+            <a:ext uri="{909E8E84-426E-40DD-AFC4-6F175D3DCCD1}">
+              <a14:hiddenFill xmlns:a14="http://schemas.microsoft.com/office/drawing/2010/main">
+                <a:solidFill>
+                  <a:schemeClr val="tx2"/>
+                </a:solidFill>
+              </a14:hiddenFill>
+            </a:ext>
+            <a:ext uri="{AF507438-7753-43E0-B8FC-AC1667EBCBE1}">
+              <a14:hiddenEffects xmlns:a14="http://schemas.microsoft.com/office/drawing/2010/main">
+                <a:effectLst>
+                  <a:outerShdw dist="35921" dir="2700000" algn="ctr" rotWithShape="0">
+                    <a:schemeClr val="bg2"/>
+                  </a:outerShdw>
+                </a:effectLst>
+              </a14:hiddenEffects>
+            </a:ext>
+          </a:extLst>
+        </p:spPr>
+        <p:txBody>
+          <a:bodyPr vert="horz" wrap="square" lIns="90000" tIns="46800" rIns="90000" bIns="46800" numCol="1" rtlCol="0" anchor="ctr" anchorCtr="0" compatLnSpc="1">
+            <a:prstTxWarp prst="textNoShape">
+              <a:avLst/>
+            </a:prstTxWarp>
+          </a:bodyPr>
+          <a:lstStyle/>
+          <a:p>
+            <a:pPr marL="0" marR="0" indent="0" algn="ctr" defTabSz="914400" rtl="0" eaLnBrk="0" fontAlgn="base" latinLnBrk="0" hangingPunct="0">
+              <a:lnSpc>
+                <a:spcPct val="100000"/>
+              </a:lnSpc>
+              <a:spcBef>
+                <a:spcPct val="0"/>
+              </a:spcBef>
+              <a:spcAft>
+                <a:spcPct val="0"/>
+              </a:spcAft>
+              <a:buClrTx/>
+              <a:buSzTx/>
+              <a:buFontTx/>
+              <a:buNone/>
+              <a:tabLst/>
+            </a:pPr>
+            <a:r>
+              <a:rPr lang="en-US" dirty="0"/>
+              <a:t>[</a:t>
+            </a:r>
+            <a:r>
+              <a:rPr lang="en-US" dirty="0" err="1"/>
+              <a:t>new_val</a:t>
+            </a:r>
+            <a:r>
+              <a:rPr lang="en-US" dirty="0"/>
+              <a:t>, </a:t>
+            </a:r>
+            <a:r>
+              <a:rPr lang="en-US" dirty="0" err="1"/>
+              <a:t>new_idx</a:t>
+            </a:r>
+            <a:r>
+              <a:rPr lang="en-US" dirty="0"/>
+              <a:t>] = </a:t>
+            </a:r>
+            <a:r>
+              <a:rPr kumimoji="0" lang="en-US" sz="1800" b="0" i="0" u="none" strike="noStrike" cap="none" normalizeH="0" baseline="0" dirty="0" err="1">
+                <a:ln>
+                  <a:noFill/>
+                </a:ln>
+                <a:solidFill>
+                  <a:schemeClr val="tx1"/>
+                </a:solidFill>
+                <a:effectLst/>
+                <a:latin typeface="Arial" charset="0"/>
+              </a:rPr>
+              <a:t>process_values</a:t>
+            </a:r>
+            <a:r>
+              <a:rPr kumimoji="0" lang="en-US" sz="1800" b="0" i="0" u="none" strike="noStrike" cap="none" normalizeH="0" baseline="0" dirty="0">
+                <a:ln>
+                  <a:noFill/>
+                </a:ln>
+                <a:solidFill>
+                  <a:schemeClr val="tx1"/>
+                </a:solidFill>
+                <a:effectLst/>
+                <a:latin typeface="Arial" charset="0"/>
+              </a:rPr>
+              <a:t> </a:t>
+            </a:r>
+            <a:r>
+              <a:rPr lang="en-US" dirty="0"/>
+              <a:t>( </a:t>
+            </a:r>
+            <a:r>
+              <a:rPr lang="en-US" dirty="0" err="1"/>
+              <a:t>val</a:t>
+            </a:r>
+            <a:r>
+              <a:rPr lang="en-US" dirty="0"/>
+              <a:t>, </a:t>
+            </a:r>
+            <a:r>
+              <a:rPr lang="en-US" dirty="0" err="1"/>
+              <a:t>idx</a:t>
+            </a:r>
+            <a:r>
+              <a:rPr lang="en-US" dirty="0"/>
+              <a:t> )</a:t>
+            </a:r>
+            <a:endParaRPr kumimoji="0" lang="de-DE" sz="1800" b="0" i="0" u="none" strike="noStrike" cap="none" normalizeH="0" baseline="0" dirty="0">
+              <a:ln>
+                <a:noFill/>
+              </a:ln>
+              <a:solidFill>
+                <a:schemeClr val="tx1"/>
+              </a:solidFill>
+              <a:effectLst/>
+              <a:latin typeface="Arial" charset="0"/>
+            </a:endParaRPr>
+          </a:p>
+        </p:txBody>
+      </p:sp>
+      <p:cxnSp>
+        <p:nvCxnSpPr>
+          <p:cNvPr id="12" name="Gerade Verbindung mit Pfeil 11">
+            <a:extLst>
+              <a:ext uri="{FF2B5EF4-FFF2-40B4-BE49-F238E27FC236}">
+                <a16:creationId xmlns:a16="http://schemas.microsoft.com/office/drawing/2014/main" id="{1EA36BE2-B49E-4D36-BFEB-C954E0D31D3E}"/>
+              </a:ext>
+            </a:extLst>
+          </p:cNvPr>
+          <p:cNvCxnSpPr>
+            <a:stCxn id="2" idx="2"/>
+            <a:endCxn id="8" idx="0"/>
+          </p:cNvCxnSpPr>
+          <p:nvPr/>
+        </p:nvCxnSpPr>
+        <p:spPr bwMode="auto">
+          <a:xfrm>
+            <a:off x="4644008" y="3345777"/>
+            <a:ext cx="0" cy="756000"/>
+          </a:xfrm>
+          <a:prstGeom prst="straightConnector1">
+            <a:avLst/>
+          </a:prstGeom>
+          <a:noFill/>
+          <a:ln w="19050" cap="flat" cmpd="sng" algn="ctr">
+            <a:solidFill>
+              <a:schemeClr val="hlink"/>
+            </a:solidFill>
+            <a:prstDash val="solid"/>
+            <a:round/>
+            <a:headEnd type="none" w="med" len="med"/>
+            <a:tailEnd type="triangle"/>
+          </a:ln>
+          <a:effectLst/>
+          <a:extLst>
+            <a:ext uri="{909E8E84-426E-40DD-AFC4-6F175D3DCCD1}">
+              <a14:hiddenFill xmlns:a14="http://schemas.microsoft.com/office/drawing/2010/main">
+                <a:solidFill>
+                  <a:schemeClr val="tx2"/>
+                </a:solidFill>
+              </a14:hiddenFill>
+            </a:ext>
+            <a:ext uri="{AF507438-7753-43E0-B8FC-AC1667EBCBE1}">
+              <a14:hiddenEffects xmlns:a14="http://schemas.microsoft.com/office/drawing/2010/main">
+                <a:effectLst>
+                  <a:outerShdw dist="35921" dir="2700000" algn="ctr" rotWithShape="0">
+                    <a:schemeClr val="bg2"/>
+                  </a:outerShdw>
+                </a:effectLst>
+              </a14:hiddenEffects>
+            </a:ext>
+          </a:extLst>
+        </p:spPr>
+      </p:cxnSp>
+      <p:cxnSp>
+        <p:nvCxnSpPr>
+          <p:cNvPr id="14" name="Gerade Verbindung mit Pfeil 13">
+            <a:extLst>
+              <a:ext uri="{FF2B5EF4-FFF2-40B4-BE49-F238E27FC236}">
+                <a16:creationId xmlns:a16="http://schemas.microsoft.com/office/drawing/2014/main" id="{4E65874E-035B-438F-BEC5-083A5BC90F17}"/>
+              </a:ext>
+            </a:extLst>
+          </p:cNvPr>
+          <p:cNvCxnSpPr>
+            <a:stCxn id="8" idx="2"/>
+            <a:endCxn id="10" idx="0"/>
+          </p:cNvCxnSpPr>
+          <p:nvPr/>
+        </p:nvCxnSpPr>
+        <p:spPr bwMode="auto">
+          <a:xfrm>
+            <a:off x="4644008" y="4461817"/>
+            <a:ext cx="0" cy="786395"/>
+          </a:xfrm>
+          <a:prstGeom prst="straightConnector1">
+            <a:avLst/>
+          </a:prstGeom>
+          <a:noFill/>
+          <a:ln w="19050" cap="flat" cmpd="sng" algn="ctr">
+            <a:solidFill>
+              <a:schemeClr val="hlink"/>
+            </a:solidFill>
+            <a:prstDash val="solid"/>
+            <a:round/>
+            <a:headEnd type="none" w="med" len="med"/>
+            <a:tailEnd type="triangle"/>
+          </a:ln>
+          <a:effectLst/>
+          <a:extLst>
+            <a:ext uri="{909E8E84-426E-40DD-AFC4-6F175D3DCCD1}">
+              <a14:hiddenFill xmlns:a14="http://schemas.microsoft.com/office/drawing/2010/main">
+                <a:solidFill>
+                  <a:schemeClr val="tx2"/>
+                </a:solidFill>
+              </a14:hiddenFill>
+            </a:ext>
+            <a:ext uri="{AF507438-7753-43E0-B8FC-AC1667EBCBE1}">
+              <a14:hiddenEffects xmlns:a14="http://schemas.microsoft.com/office/drawing/2010/main">
+                <a:effectLst>
+                  <a:outerShdw dist="35921" dir="2700000" algn="ctr" rotWithShape="0">
+                    <a:schemeClr val="bg2"/>
+                  </a:outerShdw>
+                </a:effectLst>
+              </a14:hiddenEffects>
+            </a:ext>
+          </a:extLst>
+        </p:spPr>
+      </p:cxnSp>
     </p:spTree>
     <p:extLst>
       <p:ext uri="{BB962C8B-B14F-4D97-AF65-F5344CB8AC3E}">
-        <p14:creationId xmlns:p14="http://schemas.microsoft.com/office/powerpoint/2010/main" val="1080710209"/>
+        <p14:creationId xmlns:p14="http://schemas.microsoft.com/office/powerpoint/2010/main" val="757870135"/>
       </p:ext>
     </p:extLst>
   </p:cSld>
@@ -18303,53 +20431,416 @@
           <a:bodyPr/>
           <a:lstStyle/>
           <a:p>
-            <a:br>
+            <a:r>
               <a:rPr lang="de-DE" altLang="de-DE" dirty="0"/>
-            </a:br>
-            <a:endParaRPr lang="de-DE" altLang="de-DE" dirty="0"/>
+              <a:t>4. Modulbeschreibung</a:t>
+            </a:r>
           </a:p>
         </p:txBody>
       </p:sp>
-      <p:pic>
-        <p:nvPicPr>
-          <p:cNvPr id="7" name="Grafik 6">
-            <a:extLst>
-              <a:ext uri="{FF2B5EF4-FFF2-40B4-BE49-F238E27FC236}">
-                <a16:creationId xmlns:a16="http://schemas.microsoft.com/office/drawing/2014/main" id="{8483136C-9CE8-4C03-9D7D-41B57C8F8891}"/>
-              </a:ext>
-            </a:extLst>
-          </p:cNvPr>
-          <p:cNvPicPr>
-            <a:picLocks noChangeAspect="1"/>
-          </p:cNvPicPr>
-          <p:nvPr/>
-        </p:nvPicPr>
-        <p:blipFill>
-          <a:blip r:embed="rId2">
-            <a:extLst>
-              <a:ext uri="{28A0092B-C50C-407E-A947-70E740481C1C}">
-                <a14:useLocalDpi xmlns:a14="http://schemas.microsoft.com/office/drawing/2010/main" val="0"/>
-              </a:ext>
-            </a:extLst>
-          </a:blip>
-          <a:stretch>
-            <a:fillRect/>
-          </a:stretch>
-        </p:blipFill>
-        <p:spPr>
-          <a:xfrm>
-            <a:off x="665820" y="1196752"/>
-            <a:ext cx="7812360" cy="5122859"/>
-          </a:xfrm>
-          <a:prstGeom prst="rect">
-            <a:avLst/>
-          </a:prstGeom>
-        </p:spPr>
-      </p:pic>
+      <mc:AlternateContent xmlns:mc="http://schemas.openxmlformats.org/markup-compatibility/2006">
+        <mc:Choice xmlns:a14="http://schemas.microsoft.com/office/drawing/2010/main" Requires="a14">
+          <p:sp>
+            <p:nvSpPr>
+              <p:cNvPr id="6" name="Rectangle 3"/>
+              <p:cNvSpPr txBox="1">
+                <a:spLocks noChangeArrowheads="1"/>
+              </p:cNvSpPr>
+              <p:nvPr/>
+            </p:nvSpPr>
+            <p:spPr>
+              <a:xfrm>
+                <a:off x="971550" y="2160000"/>
+                <a:ext cx="7677150" cy="3600450"/>
+              </a:xfrm>
+              <a:prstGeom prst="rect">
+                <a:avLst/>
+              </a:prstGeom>
+            </p:spPr>
+            <p:txBody>
+              <a:bodyPr/>
+              <a:lstStyle>
+                <a:lvl1pPr algn="l" rtl="0" eaLnBrk="1" fontAlgn="base" hangingPunct="1">
+                  <a:lnSpc>
+                    <a:spcPct val="110000"/>
+                  </a:lnSpc>
+                  <a:spcBef>
+                    <a:spcPct val="0"/>
+                  </a:spcBef>
+                  <a:spcAft>
+                    <a:spcPct val="20000"/>
+                  </a:spcAft>
+                  <a:defRPr>
+                    <a:solidFill>
+                      <a:schemeClr val="tx1"/>
+                    </a:solidFill>
+                    <a:latin typeface="+mn-lt"/>
+                    <a:ea typeface="+mn-ea"/>
+                    <a:cs typeface="+mn-cs"/>
+                  </a:defRPr>
+                </a:lvl1pPr>
+                <a:lvl2pPr marL="182563" indent="-180975" algn="l" rtl="0" eaLnBrk="1" fontAlgn="base" hangingPunct="1">
+                  <a:lnSpc>
+                    <a:spcPct val="110000"/>
+                  </a:lnSpc>
+                  <a:spcBef>
+                    <a:spcPct val="0"/>
+                  </a:spcBef>
+                  <a:spcAft>
+                    <a:spcPct val="20000"/>
+                  </a:spcAft>
+                  <a:buFont typeface="Arial" charset="0"/>
+                  <a:buChar char="•"/>
+                  <a:defRPr>
+                    <a:solidFill>
+                      <a:schemeClr val="tx1"/>
+                    </a:solidFill>
+                    <a:latin typeface="+mn-lt"/>
+                  </a:defRPr>
+                </a:lvl2pPr>
+                <a:lvl3pPr marL="366713" indent="-182563" algn="l" rtl="0" eaLnBrk="1" fontAlgn="base" hangingPunct="1">
+                  <a:lnSpc>
+                    <a:spcPct val="110000"/>
+                  </a:lnSpc>
+                  <a:spcBef>
+                    <a:spcPct val="0"/>
+                  </a:spcBef>
+                  <a:spcAft>
+                    <a:spcPct val="20000"/>
+                  </a:spcAft>
+                  <a:buFont typeface="Arial" charset="0"/>
+                  <a:buChar char="•"/>
+                  <a:defRPr>
+                    <a:solidFill>
+                      <a:schemeClr val="tx1"/>
+                    </a:solidFill>
+                    <a:latin typeface="+mn-lt"/>
+                  </a:defRPr>
+                </a:lvl3pPr>
+                <a:lvl4pPr marL="552450" indent="-184150" algn="l" rtl="0" eaLnBrk="1" fontAlgn="base" hangingPunct="1">
+                  <a:lnSpc>
+                    <a:spcPct val="110000"/>
+                  </a:lnSpc>
+                  <a:spcBef>
+                    <a:spcPct val="0"/>
+                  </a:spcBef>
+                  <a:spcAft>
+                    <a:spcPct val="20000"/>
+                  </a:spcAft>
+                  <a:buFont typeface="Arial" charset="0"/>
+                  <a:buChar char="•"/>
+                  <a:defRPr>
+                    <a:solidFill>
+                      <a:schemeClr val="tx1"/>
+                    </a:solidFill>
+                    <a:latin typeface="+mn-lt"/>
+                  </a:defRPr>
+                </a:lvl4pPr>
+                <a:lvl5pPr marL="738188" indent="-184150" algn="l" rtl="0" eaLnBrk="1" fontAlgn="base" hangingPunct="1">
+                  <a:lnSpc>
+                    <a:spcPct val="110000"/>
+                  </a:lnSpc>
+                  <a:spcBef>
+                    <a:spcPct val="0"/>
+                  </a:spcBef>
+                  <a:spcAft>
+                    <a:spcPct val="20000"/>
+                  </a:spcAft>
+                  <a:buFont typeface="Arial" charset="0"/>
+                  <a:buChar char="•"/>
+                  <a:defRPr>
+                    <a:solidFill>
+                      <a:schemeClr val="tx1"/>
+                    </a:solidFill>
+                    <a:latin typeface="+mn-lt"/>
+                  </a:defRPr>
+                </a:lvl5pPr>
+                <a:lvl6pPr marL="1195388" indent="-184150" algn="l" rtl="0" eaLnBrk="1" fontAlgn="base" hangingPunct="1">
+                  <a:lnSpc>
+                    <a:spcPct val="110000"/>
+                  </a:lnSpc>
+                  <a:spcBef>
+                    <a:spcPct val="0"/>
+                  </a:spcBef>
+                  <a:spcAft>
+                    <a:spcPct val="20000"/>
+                  </a:spcAft>
+                  <a:buFont typeface="Arial" charset="0"/>
+                  <a:buChar char="•"/>
+                  <a:defRPr>
+                    <a:solidFill>
+                      <a:schemeClr val="tx1"/>
+                    </a:solidFill>
+                    <a:latin typeface="+mn-lt"/>
+                  </a:defRPr>
+                </a:lvl6pPr>
+                <a:lvl7pPr marL="1652588" indent="-184150" algn="l" rtl="0" eaLnBrk="1" fontAlgn="base" hangingPunct="1">
+                  <a:lnSpc>
+                    <a:spcPct val="110000"/>
+                  </a:lnSpc>
+                  <a:spcBef>
+                    <a:spcPct val="0"/>
+                  </a:spcBef>
+                  <a:spcAft>
+                    <a:spcPct val="20000"/>
+                  </a:spcAft>
+                  <a:buFont typeface="Arial" charset="0"/>
+                  <a:buChar char="•"/>
+                  <a:defRPr>
+                    <a:solidFill>
+                      <a:schemeClr val="tx1"/>
+                    </a:solidFill>
+                    <a:latin typeface="+mn-lt"/>
+                  </a:defRPr>
+                </a:lvl7pPr>
+                <a:lvl8pPr marL="2109788" indent="-184150" algn="l" rtl="0" eaLnBrk="1" fontAlgn="base" hangingPunct="1">
+                  <a:lnSpc>
+                    <a:spcPct val="110000"/>
+                  </a:lnSpc>
+                  <a:spcBef>
+                    <a:spcPct val="0"/>
+                  </a:spcBef>
+                  <a:spcAft>
+                    <a:spcPct val="20000"/>
+                  </a:spcAft>
+                  <a:buFont typeface="Arial" charset="0"/>
+                  <a:buChar char="•"/>
+                  <a:defRPr>
+                    <a:solidFill>
+                      <a:schemeClr val="tx1"/>
+                    </a:solidFill>
+                    <a:latin typeface="+mn-lt"/>
+                  </a:defRPr>
+                </a:lvl8pPr>
+                <a:lvl9pPr marL="2566988" indent="-184150" algn="l" rtl="0" eaLnBrk="1" fontAlgn="base" hangingPunct="1">
+                  <a:lnSpc>
+                    <a:spcPct val="110000"/>
+                  </a:lnSpc>
+                  <a:spcBef>
+                    <a:spcPct val="0"/>
+                  </a:spcBef>
+                  <a:spcAft>
+                    <a:spcPct val="20000"/>
+                  </a:spcAft>
+                  <a:buFont typeface="Arial" charset="0"/>
+                  <a:buChar char="•"/>
+                  <a:defRPr>
+                    <a:solidFill>
+                      <a:schemeClr val="tx1"/>
+                    </a:solidFill>
+                    <a:latin typeface="+mn-lt"/>
+                  </a:defRPr>
+                </a:lvl9pPr>
+              </a:lstStyle>
+              <a:p>
+                <a:pPr lvl="1"/>
+                <a:r>
+                  <a:rPr lang="en-US" altLang="de-DE" kern="0" dirty="0" err="1"/>
+                  <a:t>Klassifizierung</a:t>
+                </a:r>
+                <a:endParaRPr lang="en-US" altLang="de-DE" kern="0" dirty="0"/>
+              </a:p>
+              <a:p>
+                <a:pPr lvl="2"/>
+                <a:r>
+                  <a:rPr lang="en-US" altLang="de-DE" kern="0" dirty="0" err="1"/>
+                  <a:t>Einlagiges</a:t>
+                </a:r>
+                <a:r>
+                  <a:rPr lang="en-US" altLang="de-DE" kern="0" dirty="0"/>
+                  <a:t> Perceptron Network</a:t>
+                </a:r>
+              </a:p>
+              <a:p>
+                <a:pPr lvl="2"/>
+                <a:r>
+                  <a:rPr lang="en-US" altLang="de-DE" kern="0" dirty="0" err="1"/>
+                  <a:t>Probabilistisches</a:t>
+                </a:r>
+                <a:r>
+                  <a:rPr lang="en-US" altLang="de-DE" kern="0" dirty="0"/>
+                  <a:t> </a:t>
+                </a:r>
+                <a:r>
+                  <a:rPr lang="en-US" altLang="de-DE" kern="0" dirty="0" err="1"/>
+                  <a:t>Netz</a:t>
+                </a:r>
+                <a:endParaRPr lang="en-US" altLang="de-DE" kern="0" dirty="0"/>
+              </a:p>
+              <a:p>
+                <a:pPr lvl="3"/>
+                <a:r>
+                  <a:rPr lang="en-US" altLang="de-DE" kern="0" dirty="0"/>
+                  <a:t>Input:</a:t>
+                </a:r>
+              </a:p>
+              <a:p>
+                <a:pPr lvl="4"/>
+                <a:r>
+                  <a:rPr lang="en-US" altLang="de-DE" kern="0" dirty="0"/>
+                  <a:t>1x26 </a:t>
+                </a:r>
+                <a:r>
+                  <a:rPr lang="en-US" altLang="de-DE" kern="0" dirty="0" err="1"/>
+                  <a:t>Vektor</a:t>
+                </a:r>
+                <a:r>
+                  <a:rPr lang="en-US" altLang="de-DE" kern="0" dirty="0"/>
+                  <a:t> ( </a:t>
+                </a:r>
+                <a:r>
+                  <a:rPr lang="en-US" altLang="de-DE" kern="0" dirty="0" err="1"/>
+                  <a:t>max_values</a:t>
+                </a:r>
+                <a:r>
+                  <a:rPr lang="en-US" altLang="de-DE" kern="0" dirty="0"/>
+                  <a:t>, </a:t>
+                </a:r>
+                <a:r>
+                  <a:rPr lang="en-US" altLang="de-DE" kern="0" dirty="0" err="1"/>
+                  <a:t>indeces</a:t>
+                </a:r>
+                <a:r>
+                  <a:rPr lang="en-US" altLang="de-DE" kern="0" dirty="0"/>
+                  <a:t> )</a:t>
+                </a:r>
+              </a:p>
+              <a:p>
+                <a:pPr lvl="3"/>
+                <a:r>
+                  <a:rPr lang="en-US" altLang="de-DE" kern="0" dirty="0"/>
+                  <a:t>Output</a:t>
+                </a:r>
+              </a:p>
+              <a:p>
+                <a:pPr lvl="4"/>
+                <a:r>
+                  <a:rPr lang="en-US" altLang="de-DE" kern="0" dirty="0"/>
+                  <a:t>1x1 double </a:t>
+                </a:r>
+              </a:p>
+              <a:p>
+                <a:pPr lvl="5"/>
+                <a:r>
+                  <a:rPr lang="en-US" altLang="de-DE" kern="0" dirty="0"/>
+                  <a:t>1 </a:t>
+                </a:r>
+                <a14:m>
+                  <m:oMath xmlns:m="http://schemas.openxmlformats.org/officeDocument/2006/math">
+                    <m:acc>
+                      <m:accPr>
+                        <m:chr m:val="̂"/>
+                        <m:ctrlPr>
+                          <a:rPr lang="en-US" altLang="de-DE" b="0" i="1" kern="0" smtClean="0">
+                            <a:latin typeface="Cambria Math" panose="02040503050406030204" pitchFamily="18" charset="0"/>
+                          </a:rPr>
+                        </m:ctrlPr>
+                      </m:accPr>
+                      <m:e>
+                        <m:r>
+                          <a:rPr lang="en-US" altLang="de-DE" b="0" i="1" kern="0" smtClean="0">
+                            <a:latin typeface="Cambria Math" panose="02040503050406030204" pitchFamily="18" charset="0"/>
+                          </a:rPr>
+                          <m:t>=</m:t>
+                        </m:r>
+                      </m:e>
+                    </m:acc>
+                  </m:oMath>
+                </a14:m>
+                <a:r>
+                  <a:rPr lang="de-DE" altLang="de-DE" kern="0" dirty="0"/>
+                  <a:t> 100% Apnoe</a:t>
+                </a:r>
+              </a:p>
+              <a:p>
+                <a:pPr lvl="5"/>
+                <a:r>
+                  <a:rPr lang="en-US" altLang="de-DE" kern="0" dirty="0"/>
+                  <a:t>0</a:t>
+                </a:r>
+                <a:r>
+                  <a:rPr lang="de-DE" altLang="de-DE" kern="0" dirty="0"/>
+                  <a:t> </a:t>
+                </a:r>
+                <a14:m>
+                  <m:oMath xmlns:m="http://schemas.openxmlformats.org/officeDocument/2006/math">
+                    <m:acc>
+                      <m:accPr>
+                        <m:chr m:val="̂"/>
+                        <m:ctrlPr>
+                          <a:rPr lang="en-US" altLang="de-DE" i="1" kern="0">
+                            <a:latin typeface="Cambria Math" panose="02040503050406030204" pitchFamily="18" charset="0"/>
+                          </a:rPr>
+                        </m:ctrlPr>
+                      </m:accPr>
+                      <m:e>
+                        <m:r>
+                          <a:rPr lang="en-US" altLang="de-DE" i="1" kern="0">
+                            <a:latin typeface="Cambria Math" panose="02040503050406030204" pitchFamily="18" charset="0"/>
+                          </a:rPr>
+                          <m:t>=</m:t>
+                        </m:r>
+                      </m:e>
+                    </m:acc>
+                  </m:oMath>
+                </a14:m>
+                <a:r>
+                  <a:rPr lang="de-DE" altLang="de-DE" kern="0" dirty="0"/>
+                  <a:t> 100% Kein Apnoe</a:t>
+                </a:r>
+              </a:p>
+              <a:p>
+                <a:pPr marL="1588" lvl="1" indent="0">
+                  <a:buNone/>
+                </a:pPr>
+                <a:endParaRPr lang="de-DE" altLang="de-DE" kern="0" dirty="0"/>
+              </a:p>
+            </p:txBody>
+          </p:sp>
+        </mc:Choice>
+        <mc:Fallback>
+          <p:sp>
+            <p:nvSpPr>
+              <p:cNvPr id="6" name="Rectangle 3"/>
+              <p:cNvSpPr txBox="1">
+                <a:spLocks noRot="1" noChangeAspect="1" noMove="1" noResize="1" noEditPoints="1" noAdjustHandles="1" noChangeArrowheads="1" noChangeShapeType="1" noTextEdit="1"/>
+              </p:cNvSpPr>
+              <p:nvPr/>
+            </p:nvSpPr>
+            <p:spPr>
+              <a:xfrm>
+                <a:off x="971550" y="2160000"/>
+                <a:ext cx="7677150" cy="3600450"/>
+              </a:xfrm>
+              <a:prstGeom prst="rect">
+                <a:avLst/>
+              </a:prstGeom>
+              <a:blipFill>
+                <a:blip r:embed="rId3"/>
+                <a:stretch>
+                  <a:fillRect l="-476" t="-677"/>
+                </a:stretch>
+              </a:blipFill>
+            </p:spPr>
+            <p:txBody>
+              <a:bodyPr/>
+              <a:lstStyle/>
+              <a:p>
+                <a:r>
+                  <a:rPr lang="de-DE">
+                    <a:noFill/>
+                  </a:rPr>
+                  <a:t> </a:t>
+                </a:r>
+              </a:p>
+            </p:txBody>
+          </p:sp>
+        </mc:Fallback>
+      </mc:AlternateContent>
     </p:spTree>
     <p:extLst>
       <p:ext uri="{BB962C8B-B14F-4D97-AF65-F5344CB8AC3E}">
-        <p14:creationId xmlns:p14="http://schemas.microsoft.com/office/powerpoint/2010/main" val="422122669"/>
+        <p14:creationId xmlns:p14="http://schemas.microsoft.com/office/powerpoint/2010/main" val="1117926786"/>
       </p:ext>
     </p:extLst>
   </p:cSld>
@@ -18437,7 +20928,7 @@
         <p:spPr>
           <a:xfrm>
             <a:off x="971550" y="1404000"/>
-            <a:ext cx="6984826" cy="792162"/>
+            <a:ext cx="7704138" cy="792162"/>
           </a:xfrm>
         </p:spPr>
         <p:txBody>
@@ -18446,7 +20937,7 @@
           <a:p>
             <a:r>
               <a:rPr lang="de-DE" altLang="de-DE" dirty="0"/>
-              <a:t>Überschrift Bildfolie – zwei Bilder mit Text</a:t>
+              <a:t>5. Fazit</a:t>
             </a:r>
           </a:p>
         </p:txBody>
@@ -18461,8 +20952,8 @@
         </p:nvSpPr>
         <p:spPr>
           <a:xfrm>
-            <a:off x="971550" y="5373688"/>
-            <a:ext cx="3744913" cy="863600"/>
+            <a:off x="971550" y="2160000"/>
+            <a:ext cx="7677150" cy="3600450"/>
           </a:xfrm>
           <a:prstGeom prst="rect">
             <a:avLst/>
@@ -18644,625 +21135,23 @@
             </a:lvl9pPr>
           </a:lstStyle>
           <a:p>
+            <a:pPr lvl="1"/>
             <a:r>
-              <a:rPr lang="de-DE" altLang="de-DE" sz="1500" kern="0"/>
-              <a:t>Mit seiner Aufnahme in die Elite war Knechts Leben auf eine andre Ebene verpflanzt.</a:t>
+              <a:rPr lang="de-DE" altLang="de-DE" kern="0" dirty="0" err="1"/>
+              <a:t>asdf</a:t>
             </a:r>
-          </a:p>
-        </p:txBody>
-      </p:sp>
-      <p:sp>
-        <p:nvSpPr>
-          <p:cNvPr id="7" name="Rectangle 4"/>
-          <p:cNvSpPr>
-            <a:spLocks noChangeArrowheads="1"/>
-          </p:cNvSpPr>
-          <p:nvPr/>
-        </p:nvSpPr>
-        <p:spPr bwMode="invGray">
-          <a:xfrm>
-            <a:off x="971550" y="2060848"/>
-            <a:ext cx="3744913" cy="3096940"/>
-          </a:xfrm>
-          <a:prstGeom prst="rect">
-            <a:avLst/>
-          </a:prstGeom>
-          <a:solidFill>
-            <a:srgbClr val="C0C0C0"/>
-          </a:solidFill>
-          <a:ln>
-            <a:noFill/>
-          </a:ln>
-          <a:effectLst/>
-          <a:extLst>
-            <a:ext uri="{91240B29-F687-4F45-9708-019B960494DF}">
-              <a14:hiddenLine xmlns:a14="http://schemas.microsoft.com/office/drawing/2010/main" w="19050" algn="ctr">
-                <a:solidFill>
-                  <a:schemeClr val="tx2"/>
-                </a:solidFill>
-                <a:miter lim="800000"/>
-                <a:headEnd/>
-                <a:tailEnd/>
-              </a14:hiddenLine>
-            </a:ext>
-            <a:ext uri="{AF507438-7753-43E0-B8FC-AC1667EBCBE1}">
-              <a14:hiddenEffects xmlns:a14="http://schemas.microsoft.com/office/drawing/2010/main">
-                <a:effectLst>
-                  <a:outerShdw dist="35921" dir="2700000" algn="ctr" rotWithShape="0">
-                    <a:schemeClr val="bg2"/>
-                  </a:outerShdw>
-                </a:effectLst>
-              </a14:hiddenEffects>
-            </a:ext>
-          </a:extLst>
-        </p:spPr>
-        <p:txBody>
-          <a:bodyPr lIns="0" tIns="0" rIns="0" bIns="0" anchor="ctr"/>
-          <a:lstStyle>
-            <a:lvl1pPr marL="376238" algn="l">
-              <a:defRPr sz="2400">
-                <a:solidFill>
-                  <a:schemeClr val="tx1"/>
-                </a:solidFill>
-                <a:latin typeface="Arial" charset="0"/>
-              </a:defRPr>
-            </a:lvl1pPr>
-            <a:lvl2pPr marL="566738" algn="l">
-              <a:defRPr sz="2400">
-                <a:solidFill>
-                  <a:schemeClr val="tx1"/>
-                </a:solidFill>
-                <a:latin typeface="Arial" charset="0"/>
-              </a:defRPr>
-            </a:lvl2pPr>
-            <a:lvl3pPr algn="l">
-              <a:defRPr sz="2400">
-                <a:solidFill>
-                  <a:schemeClr val="tx1"/>
-                </a:solidFill>
-                <a:latin typeface="Arial" charset="0"/>
-              </a:defRPr>
-            </a:lvl3pPr>
-            <a:lvl4pPr algn="l">
-              <a:defRPr sz="2400">
-                <a:solidFill>
-                  <a:schemeClr val="tx1"/>
-                </a:solidFill>
-                <a:latin typeface="Arial" charset="0"/>
-              </a:defRPr>
-            </a:lvl4pPr>
-            <a:lvl5pPr algn="l">
-              <a:defRPr sz="2400">
-                <a:solidFill>
-                  <a:schemeClr val="tx1"/>
-                </a:solidFill>
-                <a:latin typeface="Arial" charset="0"/>
-              </a:defRPr>
-            </a:lvl5pPr>
-            <a:lvl6pPr eaLnBrk="0" fontAlgn="base" hangingPunct="0">
-              <a:spcBef>
-                <a:spcPct val="0"/>
-              </a:spcBef>
-              <a:spcAft>
-                <a:spcPct val="0"/>
-              </a:spcAft>
-              <a:defRPr sz="2400">
-                <a:solidFill>
-                  <a:schemeClr val="tx1"/>
-                </a:solidFill>
-                <a:latin typeface="Arial" charset="0"/>
-              </a:defRPr>
-            </a:lvl6pPr>
-            <a:lvl7pPr eaLnBrk="0" fontAlgn="base" hangingPunct="0">
-              <a:spcBef>
-                <a:spcPct val="0"/>
-              </a:spcBef>
-              <a:spcAft>
-                <a:spcPct val="0"/>
-              </a:spcAft>
-              <a:defRPr sz="2400">
-                <a:solidFill>
-                  <a:schemeClr val="tx1"/>
-                </a:solidFill>
-                <a:latin typeface="Arial" charset="0"/>
-              </a:defRPr>
-            </a:lvl7pPr>
-            <a:lvl8pPr eaLnBrk="0" fontAlgn="base" hangingPunct="0">
-              <a:spcBef>
-                <a:spcPct val="0"/>
-              </a:spcBef>
-              <a:spcAft>
-                <a:spcPct val="0"/>
-              </a:spcAft>
-              <a:defRPr sz="2400">
-                <a:solidFill>
-                  <a:schemeClr val="tx1"/>
-                </a:solidFill>
-                <a:latin typeface="Arial" charset="0"/>
-              </a:defRPr>
-            </a:lvl8pPr>
-            <a:lvl9pPr eaLnBrk="0" fontAlgn="base" hangingPunct="0">
-              <a:spcBef>
-                <a:spcPct val="0"/>
-              </a:spcBef>
-              <a:spcAft>
-                <a:spcPct val="0"/>
-              </a:spcAft>
-              <a:defRPr sz="2400">
-                <a:solidFill>
-                  <a:schemeClr val="tx1"/>
-                </a:solidFill>
-                <a:latin typeface="Arial" charset="0"/>
-              </a:defRPr>
-            </a:lvl9pPr>
-          </a:lstStyle>
-          <a:p>
-            <a:pPr eaLnBrk="1" hangingPunct="1">
-              <a:spcBef>
-                <a:spcPct val="30000"/>
-              </a:spcBef>
-            </a:pPr>
-            <a:r>
-              <a:rPr lang="de-DE" altLang="de-DE" sz="1300" b="1" dirty="0">
-                <a:solidFill>
-                  <a:srgbClr val="000000"/>
-                </a:solidFill>
-              </a:rPr>
-              <a:t>BILD</a:t>
-            </a:r>
+            <a:endParaRPr lang="de-DE" altLang="de-DE" kern="0" dirty="0"/>
           </a:p>
           <a:p>
-            <a:pPr eaLnBrk="1" hangingPunct="1">
-              <a:spcBef>
-                <a:spcPct val="30000"/>
-              </a:spcBef>
-            </a:pPr>
-            <a:r>
-              <a:rPr lang="de-DE" altLang="de-DE" sz="1300" dirty="0">
-                <a:solidFill>
-                  <a:srgbClr val="000000"/>
-                </a:solidFill>
-              </a:rPr>
-              <a:t>Positionierungsfläche für Bilder.</a:t>
-            </a:r>
-          </a:p>
-          <a:p>
-            <a:pPr eaLnBrk="1" hangingPunct="1">
-              <a:spcBef>
-                <a:spcPct val="30000"/>
-              </a:spcBef>
-            </a:pPr>
-            <a:r>
-              <a:rPr lang="de-DE" altLang="de-DE" sz="1300" dirty="0">
-                <a:solidFill>
-                  <a:srgbClr val="000000"/>
-                </a:solidFill>
-              </a:rPr>
-              <a:t>Bitte in linker oberer Ecke beginnen.</a:t>
-            </a:r>
-          </a:p>
-          <a:p>
-            <a:pPr eaLnBrk="1" hangingPunct="1">
-              <a:spcBef>
-                <a:spcPct val="30000"/>
-              </a:spcBef>
-            </a:pPr>
-            <a:r>
-              <a:rPr lang="de-DE" altLang="de-DE" sz="1300" dirty="0">
-                <a:solidFill>
-                  <a:srgbClr val="000000"/>
-                </a:solidFill>
-              </a:rPr>
-              <a:t>Bis maximal rechte und/oder untere Begrenzung, ggf. Bild beschneiden.</a:t>
-            </a:r>
-          </a:p>
-          <a:p>
-            <a:pPr eaLnBrk="1" hangingPunct="1">
-              <a:spcBef>
-                <a:spcPct val="30000"/>
-              </a:spcBef>
-            </a:pPr>
-            <a:endParaRPr lang="de-DE" altLang="de-DE" sz="1300" dirty="0">
-              <a:solidFill>
-                <a:srgbClr val="000000"/>
-              </a:solidFill>
-            </a:endParaRPr>
-          </a:p>
-        </p:txBody>
-      </p:sp>
-      <p:sp>
-        <p:nvSpPr>
-          <p:cNvPr id="8" name="Rectangle 11"/>
-          <p:cNvSpPr>
-            <a:spLocks noChangeArrowheads="1"/>
-          </p:cNvSpPr>
-          <p:nvPr/>
-        </p:nvSpPr>
-        <p:spPr bwMode="gray">
-          <a:xfrm>
-            <a:off x="4932363" y="5373688"/>
-            <a:ext cx="3743325" cy="863600"/>
-          </a:xfrm>
-          <a:prstGeom prst="rect">
-            <a:avLst/>
-          </a:prstGeom>
-          <a:noFill/>
-          <a:ln>
-            <a:noFill/>
-          </a:ln>
-          <a:effectLst/>
-          <a:extLst>
-            <a:ext uri="{909E8E84-426E-40DD-AFC4-6F175D3DCCD1}">
-              <a14:hiddenFill xmlns:a14="http://schemas.microsoft.com/office/drawing/2010/main">
-                <a:solidFill>
-                  <a:schemeClr val="tx2"/>
-                </a:solidFill>
-              </a14:hiddenFill>
-            </a:ext>
-            <a:ext uri="{91240B29-F687-4F45-9708-019B960494DF}">
-              <a14:hiddenLine xmlns:a14="http://schemas.microsoft.com/office/drawing/2010/main" w="9525">
-                <a:solidFill>
-                  <a:schemeClr val="tx1"/>
-                </a:solidFill>
-                <a:miter lim="800000"/>
-                <a:headEnd/>
-                <a:tailEnd/>
-              </a14:hiddenLine>
-            </a:ext>
-            <a:ext uri="{AF507438-7753-43E0-B8FC-AC1667EBCBE1}">
-              <a14:hiddenEffects xmlns:a14="http://schemas.microsoft.com/office/drawing/2010/main">
-                <a:effectLst>
-                  <a:outerShdw dist="35921" dir="2700000" algn="ctr" rotWithShape="0">
-                    <a:schemeClr val="bg2"/>
-                  </a:outerShdw>
-                </a:effectLst>
-              </a14:hiddenEffects>
-            </a:ext>
-          </a:extLst>
-        </p:spPr>
-        <p:txBody>
-          <a:bodyPr lIns="0" tIns="0" rIns="0" bIns="0"/>
-          <a:lstStyle>
-            <a:lvl1pPr algn="l">
-              <a:defRPr sz="2400">
-                <a:solidFill>
-                  <a:schemeClr val="tx1"/>
-                </a:solidFill>
-                <a:latin typeface="Arial" charset="0"/>
-              </a:defRPr>
-            </a:lvl1pPr>
-            <a:lvl2pPr marL="188913" indent="133350" algn="l">
-              <a:defRPr sz="2400">
-                <a:solidFill>
-                  <a:schemeClr val="tx1"/>
-                </a:solidFill>
-                <a:latin typeface="Arial" charset="0"/>
-              </a:defRPr>
-            </a:lvl2pPr>
-            <a:lvl3pPr marL="339725" indent="123825" algn="l">
-              <a:defRPr sz="2400">
-                <a:solidFill>
-                  <a:schemeClr val="tx1"/>
-                </a:solidFill>
-                <a:latin typeface="Arial" charset="0"/>
-              </a:defRPr>
-            </a:lvl3pPr>
-            <a:lvl4pPr marL="479425" indent="123825" algn="l">
-              <a:defRPr sz="2400">
-                <a:solidFill>
-                  <a:schemeClr val="tx1"/>
-                </a:solidFill>
-                <a:latin typeface="Arial" charset="0"/>
-              </a:defRPr>
-            </a:lvl4pPr>
-            <a:lvl5pPr marL="622300" indent="120650" algn="l">
-              <a:defRPr sz="2400">
-                <a:solidFill>
-                  <a:schemeClr val="tx1"/>
-                </a:solidFill>
-                <a:latin typeface="Arial" charset="0"/>
-              </a:defRPr>
-            </a:lvl5pPr>
-            <a:lvl6pPr marL="1079500" indent="120650" eaLnBrk="0" fontAlgn="base" hangingPunct="0">
-              <a:spcBef>
-                <a:spcPct val="0"/>
-              </a:spcBef>
-              <a:spcAft>
-                <a:spcPct val="0"/>
-              </a:spcAft>
-              <a:defRPr sz="2400">
-                <a:solidFill>
-                  <a:schemeClr val="tx1"/>
-                </a:solidFill>
-                <a:latin typeface="Arial" charset="0"/>
-              </a:defRPr>
-            </a:lvl6pPr>
-            <a:lvl7pPr marL="1536700" indent="120650" eaLnBrk="0" fontAlgn="base" hangingPunct="0">
-              <a:spcBef>
-                <a:spcPct val="0"/>
-              </a:spcBef>
-              <a:spcAft>
-                <a:spcPct val="0"/>
-              </a:spcAft>
-              <a:defRPr sz="2400">
-                <a:solidFill>
-                  <a:schemeClr val="tx1"/>
-                </a:solidFill>
-                <a:latin typeface="Arial" charset="0"/>
-              </a:defRPr>
-            </a:lvl7pPr>
-            <a:lvl8pPr marL="1993900" indent="120650" eaLnBrk="0" fontAlgn="base" hangingPunct="0">
-              <a:spcBef>
-                <a:spcPct val="0"/>
-              </a:spcBef>
-              <a:spcAft>
-                <a:spcPct val="0"/>
-              </a:spcAft>
-              <a:defRPr sz="2400">
-                <a:solidFill>
-                  <a:schemeClr val="tx1"/>
-                </a:solidFill>
-                <a:latin typeface="Arial" charset="0"/>
-              </a:defRPr>
-            </a:lvl8pPr>
-            <a:lvl9pPr marL="2451100" indent="120650" eaLnBrk="0" fontAlgn="base" hangingPunct="0">
-              <a:spcBef>
-                <a:spcPct val="0"/>
-              </a:spcBef>
-              <a:spcAft>
-                <a:spcPct val="0"/>
-              </a:spcAft>
-              <a:defRPr sz="2400">
-                <a:solidFill>
-                  <a:schemeClr val="tx1"/>
-                </a:solidFill>
-                <a:latin typeface="Arial" charset="0"/>
-              </a:defRPr>
-            </a:lvl9pPr>
-          </a:lstStyle>
-          <a:p>
-            <a:pPr eaLnBrk="1" hangingPunct="1">
-              <a:lnSpc>
-                <a:spcPct val="110000"/>
-              </a:lnSpc>
-              <a:spcAft>
-                <a:spcPct val="20000"/>
-              </a:spcAft>
-            </a:pPr>
-            <a:r>
-              <a:rPr lang="de-DE" altLang="de-DE" sz="1500">
-                <a:solidFill>
-                  <a:srgbClr val="000000"/>
-                </a:solidFill>
-              </a:rPr>
-              <a:t>Es war der erste und entscheidende Schritt in seiner Entwicklung geschehen. </a:t>
-            </a:r>
-          </a:p>
-        </p:txBody>
-      </p:sp>
-      <p:sp>
-        <p:nvSpPr>
-          <p:cNvPr id="9" name="Rectangle 12"/>
-          <p:cNvSpPr>
-            <a:spLocks noChangeArrowheads="1"/>
-          </p:cNvSpPr>
-          <p:nvPr/>
-        </p:nvSpPr>
-        <p:spPr bwMode="invGray">
-          <a:xfrm>
-            <a:off x="4932363" y="2060848"/>
-            <a:ext cx="3743325" cy="3096940"/>
-          </a:xfrm>
-          <a:prstGeom prst="rect">
-            <a:avLst/>
-          </a:prstGeom>
-          <a:solidFill>
-            <a:srgbClr val="C0C0C0"/>
-          </a:solidFill>
-          <a:ln>
-            <a:noFill/>
-          </a:ln>
-          <a:effectLst/>
-          <a:extLst>
-            <a:ext uri="{91240B29-F687-4F45-9708-019B960494DF}">
-              <a14:hiddenLine xmlns:a14="http://schemas.microsoft.com/office/drawing/2010/main" w="19050" algn="ctr">
-                <a:solidFill>
-                  <a:schemeClr val="tx2"/>
-                </a:solidFill>
-                <a:miter lim="800000"/>
-                <a:headEnd/>
-                <a:tailEnd/>
-              </a14:hiddenLine>
-            </a:ext>
-            <a:ext uri="{AF507438-7753-43E0-B8FC-AC1667EBCBE1}">
-              <a14:hiddenEffects xmlns:a14="http://schemas.microsoft.com/office/drawing/2010/main">
-                <a:effectLst>
-                  <a:outerShdw dist="35921" dir="2700000" algn="ctr" rotWithShape="0">
-                    <a:schemeClr val="bg2"/>
-                  </a:outerShdw>
-                </a:effectLst>
-              </a14:hiddenEffects>
-            </a:ext>
-          </a:extLst>
-        </p:spPr>
-        <p:txBody>
-          <a:bodyPr lIns="0" tIns="0" rIns="0" bIns="0" anchor="ctr"/>
-          <a:lstStyle>
-            <a:lvl1pPr marL="376238" algn="l">
-              <a:defRPr sz="2400">
-                <a:solidFill>
-                  <a:schemeClr val="tx1"/>
-                </a:solidFill>
-                <a:latin typeface="Arial" charset="0"/>
-              </a:defRPr>
-            </a:lvl1pPr>
-            <a:lvl2pPr marL="566738" algn="l">
-              <a:defRPr sz="2400">
-                <a:solidFill>
-                  <a:schemeClr val="tx1"/>
-                </a:solidFill>
-                <a:latin typeface="Arial" charset="0"/>
-              </a:defRPr>
-            </a:lvl2pPr>
-            <a:lvl3pPr algn="l">
-              <a:defRPr sz="2400">
-                <a:solidFill>
-                  <a:schemeClr val="tx1"/>
-                </a:solidFill>
-                <a:latin typeface="Arial" charset="0"/>
-              </a:defRPr>
-            </a:lvl3pPr>
-            <a:lvl4pPr algn="l">
-              <a:defRPr sz="2400">
-                <a:solidFill>
-                  <a:schemeClr val="tx1"/>
-                </a:solidFill>
-                <a:latin typeface="Arial" charset="0"/>
-              </a:defRPr>
-            </a:lvl4pPr>
-            <a:lvl5pPr algn="l">
-              <a:defRPr sz="2400">
-                <a:solidFill>
-                  <a:schemeClr val="tx1"/>
-                </a:solidFill>
-                <a:latin typeface="Arial" charset="0"/>
-              </a:defRPr>
-            </a:lvl5pPr>
-            <a:lvl6pPr eaLnBrk="0" fontAlgn="base" hangingPunct="0">
-              <a:spcBef>
-                <a:spcPct val="0"/>
-              </a:spcBef>
-              <a:spcAft>
-                <a:spcPct val="0"/>
-              </a:spcAft>
-              <a:defRPr sz="2400">
-                <a:solidFill>
-                  <a:schemeClr val="tx1"/>
-                </a:solidFill>
-                <a:latin typeface="Arial" charset="0"/>
-              </a:defRPr>
-            </a:lvl6pPr>
-            <a:lvl7pPr eaLnBrk="0" fontAlgn="base" hangingPunct="0">
-              <a:spcBef>
-                <a:spcPct val="0"/>
-              </a:spcBef>
-              <a:spcAft>
-                <a:spcPct val="0"/>
-              </a:spcAft>
-              <a:defRPr sz="2400">
-                <a:solidFill>
-                  <a:schemeClr val="tx1"/>
-                </a:solidFill>
-                <a:latin typeface="Arial" charset="0"/>
-              </a:defRPr>
-            </a:lvl7pPr>
-            <a:lvl8pPr eaLnBrk="0" fontAlgn="base" hangingPunct="0">
-              <a:spcBef>
-                <a:spcPct val="0"/>
-              </a:spcBef>
-              <a:spcAft>
-                <a:spcPct val="0"/>
-              </a:spcAft>
-              <a:defRPr sz="2400">
-                <a:solidFill>
-                  <a:schemeClr val="tx1"/>
-                </a:solidFill>
-                <a:latin typeface="Arial" charset="0"/>
-              </a:defRPr>
-            </a:lvl8pPr>
-            <a:lvl9pPr eaLnBrk="0" fontAlgn="base" hangingPunct="0">
-              <a:spcBef>
-                <a:spcPct val="0"/>
-              </a:spcBef>
-              <a:spcAft>
-                <a:spcPct val="0"/>
-              </a:spcAft>
-              <a:defRPr sz="2400">
-                <a:solidFill>
-                  <a:schemeClr val="tx1"/>
-                </a:solidFill>
-                <a:latin typeface="Arial" charset="0"/>
-              </a:defRPr>
-            </a:lvl9pPr>
-          </a:lstStyle>
-          <a:p>
-            <a:pPr eaLnBrk="1" hangingPunct="1">
-              <a:spcBef>
-                <a:spcPct val="30000"/>
-              </a:spcBef>
-            </a:pPr>
-            <a:r>
-              <a:rPr lang="de-DE" altLang="de-DE" sz="1300" b="1" dirty="0">
-                <a:solidFill>
-                  <a:srgbClr val="000000"/>
-                </a:solidFill>
-              </a:rPr>
-              <a:t>BILD</a:t>
-            </a:r>
-          </a:p>
-          <a:p>
-            <a:pPr eaLnBrk="1" hangingPunct="1">
-              <a:spcBef>
-                <a:spcPct val="30000"/>
-              </a:spcBef>
-            </a:pPr>
-            <a:r>
-              <a:rPr lang="de-DE" altLang="de-DE" sz="1300" dirty="0">
-                <a:solidFill>
-                  <a:srgbClr val="000000"/>
-                </a:solidFill>
-              </a:rPr>
-              <a:t>Positionierungsfläche für Bilder.</a:t>
-            </a:r>
-          </a:p>
-          <a:p>
-            <a:pPr eaLnBrk="1" hangingPunct="1">
-              <a:spcBef>
-                <a:spcPct val="30000"/>
-              </a:spcBef>
-            </a:pPr>
-            <a:r>
-              <a:rPr lang="de-DE" altLang="de-DE" sz="1300" dirty="0">
-                <a:solidFill>
-                  <a:srgbClr val="000000"/>
-                </a:solidFill>
-              </a:rPr>
-              <a:t>Bitte in linker oberer Ecke beginnen.</a:t>
-            </a:r>
-          </a:p>
-          <a:p>
-            <a:pPr eaLnBrk="1" hangingPunct="1">
-              <a:spcBef>
-                <a:spcPct val="30000"/>
-              </a:spcBef>
-            </a:pPr>
-            <a:r>
-              <a:rPr lang="de-DE" altLang="de-DE" sz="1300" dirty="0">
-                <a:solidFill>
-                  <a:srgbClr val="000000"/>
-                </a:solidFill>
-              </a:rPr>
-              <a:t>Bis maximal rechte und/oder untere Begrenzung, ggf. Bild beschneiden.</a:t>
-            </a:r>
-          </a:p>
-          <a:p>
-            <a:pPr eaLnBrk="1" hangingPunct="1">
-              <a:spcBef>
-                <a:spcPct val="30000"/>
-              </a:spcBef>
-            </a:pPr>
-            <a:endParaRPr lang="de-DE" altLang="de-DE" sz="1300" dirty="0">
-              <a:solidFill>
-                <a:srgbClr val="000000"/>
-              </a:solidFill>
-            </a:endParaRPr>
+            <a:pPr lvl="1"/>
+            <a:endParaRPr lang="de-DE" altLang="de-DE" kern="0" dirty="0"/>
           </a:p>
         </p:txBody>
       </p:sp>
     </p:spTree>
     <p:extLst>
       <p:ext uri="{BB962C8B-B14F-4D97-AF65-F5344CB8AC3E}">
-        <p14:creationId xmlns:p14="http://schemas.microsoft.com/office/powerpoint/2010/main" val="1276860995"/>
+        <p14:creationId xmlns:p14="http://schemas.microsoft.com/office/powerpoint/2010/main" val="1080710209"/>
       </p:ext>
     </p:extLst>
   </p:cSld>

</xml_diff>

<commit_message>
Added one note to the presentation.
</commit_message>
<xml_diff>
--- a/docs/final_documentation/Musterpräsentation.pptx
+++ b/docs/final_documentation/Musterpräsentation.pptx
@@ -2768,6 +2768,17 @@
             <a:r>
               <a:rPr lang="en-US" dirty="0" err="1"/>
               <a:t>idx</a:t>
+            </a:r>
+            <a:endParaRPr lang="en-US" dirty="0"/>
+          </a:p>
+          <a:p>
+            <a:pPr marL="171450" lvl="0" indent="-171450">
+              <a:buFont typeface="Arial" panose="020B0604020202020204" pitchFamily="34" charset="0"/>
+              <a:buChar char="•"/>
+            </a:pPr>
+            <a:r>
+              <a:rPr lang="en-US"/>
+              <a:t>Downsample</a:t>
             </a:r>
             <a:endParaRPr lang="en-US" dirty="0"/>
           </a:p>
@@ -20438,8 +20449,8 @@
           </a:p>
         </p:txBody>
       </p:sp>
-      <mc:AlternateContent xmlns:mc="http://schemas.openxmlformats.org/markup-compatibility/2006">
-        <mc:Choice xmlns:a14="http://schemas.microsoft.com/office/drawing/2010/main" Requires="a14">
+      <mc:AlternateContent xmlns:mc="http://schemas.openxmlformats.org/markup-compatibility/2006" xmlns:a14="http://schemas.microsoft.com/office/drawing/2010/main">
+        <mc:Choice Requires="a14">
           <p:sp>
             <p:nvSpPr>
               <p:cNvPr id="6" name="Rectangle 3"/>
@@ -20798,7 +20809,7 @@
             </p:txBody>
           </p:sp>
         </mc:Choice>
-        <mc:Fallback>
+        <mc:Fallback xmlns="">
           <p:sp>
             <p:nvSpPr>
               <p:cNvPr id="6" name="Rectangle 3"/>

</xml_diff>